<commit_message>
Android google map and fragment
</commit_message>
<xml_diff>
--- a/3. HTML/프레젠테이션1.pptx
+++ b/3. HTML/프레젠테이션1.pptx
@@ -11,8 +11,8 @@
     <p:sldId id="259" r:id="rId5"/>
     <p:sldId id="260" r:id="rId6"/>
     <p:sldId id="263" r:id="rId7"/>
-    <p:sldId id="264" r:id="rId8"/>
-    <p:sldId id="261" r:id="rId9"/>
+    <p:sldId id="261" r:id="rId8"/>
+    <p:sldId id="264" r:id="rId9"/>
   </p:sldIdLst>
   <p:sldSz cx="12192000" cy="6858000"/>
   <p:notesSz cx="6858000" cy="9144000"/>
@@ -250,7 +250,7 @@
           <a:p>
             <a:fld id="{AF6A8A15-839E-47EF-8CE3-3F101DCA030F}" type="datetimeFigureOut">
               <a:rPr lang="ko-KR" altLang="en-US" smtClean="0"/>
-              <a:t>2020-02-06</a:t>
+              <a:t>2020-02-21</a:t>
             </a:fld>
             <a:endParaRPr lang="ko-KR" altLang="en-US"/>
           </a:p>
@@ -420,7 +420,7 @@
           <a:p>
             <a:fld id="{AF6A8A15-839E-47EF-8CE3-3F101DCA030F}" type="datetimeFigureOut">
               <a:rPr lang="ko-KR" altLang="en-US" smtClean="0"/>
-              <a:t>2020-02-06</a:t>
+              <a:t>2020-02-21</a:t>
             </a:fld>
             <a:endParaRPr lang="ko-KR" altLang="en-US"/>
           </a:p>
@@ -600,7 +600,7 @@
           <a:p>
             <a:fld id="{AF6A8A15-839E-47EF-8CE3-3F101DCA030F}" type="datetimeFigureOut">
               <a:rPr lang="ko-KR" altLang="en-US" smtClean="0"/>
-              <a:t>2020-02-06</a:t>
+              <a:t>2020-02-21</a:t>
             </a:fld>
             <a:endParaRPr lang="ko-KR" altLang="en-US"/>
           </a:p>
@@ -770,7 +770,7 @@
           <a:p>
             <a:fld id="{AF6A8A15-839E-47EF-8CE3-3F101DCA030F}" type="datetimeFigureOut">
               <a:rPr lang="ko-KR" altLang="en-US" smtClean="0"/>
-              <a:t>2020-02-06</a:t>
+              <a:t>2020-02-21</a:t>
             </a:fld>
             <a:endParaRPr lang="ko-KR" altLang="en-US"/>
           </a:p>
@@ -1016,7 +1016,7 @@
           <a:p>
             <a:fld id="{AF6A8A15-839E-47EF-8CE3-3F101DCA030F}" type="datetimeFigureOut">
               <a:rPr lang="ko-KR" altLang="en-US" smtClean="0"/>
-              <a:t>2020-02-06</a:t>
+              <a:t>2020-02-21</a:t>
             </a:fld>
             <a:endParaRPr lang="ko-KR" altLang="en-US"/>
           </a:p>
@@ -1248,7 +1248,7 @@
           <a:p>
             <a:fld id="{AF6A8A15-839E-47EF-8CE3-3F101DCA030F}" type="datetimeFigureOut">
               <a:rPr lang="ko-KR" altLang="en-US" smtClean="0"/>
-              <a:t>2020-02-06</a:t>
+              <a:t>2020-02-21</a:t>
             </a:fld>
             <a:endParaRPr lang="ko-KR" altLang="en-US"/>
           </a:p>
@@ -1615,7 +1615,7 @@
           <a:p>
             <a:fld id="{AF6A8A15-839E-47EF-8CE3-3F101DCA030F}" type="datetimeFigureOut">
               <a:rPr lang="ko-KR" altLang="en-US" smtClean="0"/>
-              <a:t>2020-02-06</a:t>
+              <a:t>2020-02-21</a:t>
             </a:fld>
             <a:endParaRPr lang="ko-KR" altLang="en-US"/>
           </a:p>
@@ -1733,7 +1733,7 @@
           <a:p>
             <a:fld id="{AF6A8A15-839E-47EF-8CE3-3F101DCA030F}" type="datetimeFigureOut">
               <a:rPr lang="ko-KR" altLang="en-US" smtClean="0"/>
-              <a:t>2020-02-06</a:t>
+              <a:t>2020-02-21</a:t>
             </a:fld>
             <a:endParaRPr lang="ko-KR" altLang="en-US"/>
           </a:p>
@@ -1828,7 +1828,7 @@
           <a:p>
             <a:fld id="{AF6A8A15-839E-47EF-8CE3-3F101DCA030F}" type="datetimeFigureOut">
               <a:rPr lang="ko-KR" altLang="en-US" smtClean="0"/>
-              <a:t>2020-02-06</a:t>
+              <a:t>2020-02-21</a:t>
             </a:fld>
             <a:endParaRPr lang="ko-KR" altLang="en-US"/>
           </a:p>
@@ -2105,7 +2105,7 @@
           <a:p>
             <a:fld id="{AF6A8A15-839E-47EF-8CE3-3F101DCA030F}" type="datetimeFigureOut">
               <a:rPr lang="ko-KR" altLang="en-US" smtClean="0"/>
-              <a:t>2020-02-06</a:t>
+              <a:t>2020-02-21</a:t>
             </a:fld>
             <a:endParaRPr lang="ko-KR" altLang="en-US"/>
           </a:p>
@@ -2358,7 +2358,7 @@
           <a:p>
             <a:fld id="{AF6A8A15-839E-47EF-8CE3-3F101DCA030F}" type="datetimeFigureOut">
               <a:rPr lang="ko-KR" altLang="en-US" smtClean="0"/>
-              <a:t>2020-02-06</a:t>
+              <a:t>2020-02-21</a:t>
             </a:fld>
             <a:endParaRPr lang="ko-KR" altLang="en-US"/>
           </a:p>
@@ -2571,7 +2571,7 @@
           <a:p>
             <a:fld id="{AF6A8A15-839E-47EF-8CE3-3F101DCA030F}" type="datetimeFigureOut">
               <a:rPr lang="ko-KR" altLang="en-US" smtClean="0"/>
-              <a:t>2020-02-06</a:t>
+              <a:t>2020-02-21</a:t>
             </a:fld>
             <a:endParaRPr lang="ko-KR" altLang="en-US"/>
           </a:p>
@@ -9297,222 +9297,1298 @@
       </p:grpSpPr>
       <p:sp>
         <p:nvSpPr>
-          <p:cNvPr id="3" name="Content Placeholder 2"/>
-          <p:cNvSpPr>
-            <a:spLocks noGrp="1"/>
-          </p:cNvSpPr>
-          <p:nvPr>
-            <p:ph idx="1"/>
-          </p:nvPr>
-        </p:nvSpPr>
-        <p:spPr>
-          <a:xfrm>
-            <a:off x="838200" y="374904"/>
-            <a:ext cx="10515600" cy="5802059"/>
-          </a:xfrm>
-        </p:spPr>
-        <p:txBody>
-          <a:bodyPr>
-            <a:noAutofit/>
+          <p:cNvPr id="4" name="직사각형 20"/>
+          <p:cNvSpPr/>
+          <p:nvPr/>
+        </p:nvSpPr>
+        <p:spPr>
+          <a:xfrm>
+            <a:off x="4228565" y="4142232"/>
+            <a:ext cx="1102466" cy="932145"/>
+          </a:xfrm>
+          <a:prstGeom prst="rect">
+            <a:avLst/>
+          </a:prstGeom>
+          <a:noFill/>
+        </p:spPr>
+        <p:style>
+          <a:lnRef idx="2">
+            <a:schemeClr val="accent1">
+              <a:shade val="50000"/>
+            </a:schemeClr>
+          </a:lnRef>
+          <a:fillRef idx="1">
+            <a:schemeClr val="accent1"/>
+          </a:fillRef>
+          <a:effectRef idx="0">
+            <a:schemeClr val="accent1"/>
+          </a:effectRef>
+          <a:fontRef idx="minor">
+            <a:schemeClr val="lt1"/>
+          </a:fontRef>
+        </p:style>
+        <p:txBody>
+          <a:bodyPr rtlCol="0" anchor="ctr"/>
+          <a:lstStyle/>
+          <a:p>
+            <a:pPr algn="ctr"/>
+            <a:r>
+              <a:rPr lang="ko-KR" altLang="en-US" sz="2000" b="1" dirty="0" smtClean="0">
+                <a:solidFill>
+                  <a:schemeClr val="tx1"/>
+                </a:solidFill>
+              </a:rPr>
+              <a:t>새로운</a:t>
+            </a:r>
+            <a:endParaRPr lang="en-US" altLang="ko-KR" sz="2000" b="1" dirty="0" smtClean="0">
+              <a:solidFill>
+                <a:schemeClr val="tx1"/>
+              </a:solidFill>
+            </a:endParaRPr>
+          </a:p>
+          <a:p>
+            <a:pPr algn="ctr"/>
+            <a:r>
+              <a:rPr lang="en-US" altLang="ko-KR" sz="2000" b="1" dirty="0" smtClean="0">
+                <a:solidFill>
+                  <a:schemeClr val="tx1"/>
+                </a:solidFill>
+              </a:rPr>
+              <a:t>VIEW</a:t>
+            </a:r>
+          </a:p>
+        </p:txBody>
+      </p:sp>
+      <p:sp>
+        <p:nvSpPr>
+          <p:cNvPr id="5" name="직사각형 20"/>
+          <p:cNvSpPr/>
+          <p:nvPr/>
+        </p:nvSpPr>
+        <p:spPr>
+          <a:xfrm>
+            <a:off x="3132678" y="2249963"/>
+            <a:ext cx="1483802" cy="932145"/>
+          </a:xfrm>
+          <a:prstGeom prst="rect">
+            <a:avLst/>
+          </a:prstGeom>
+          <a:noFill/>
+        </p:spPr>
+        <p:style>
+          <a:lnRef idx="2">
+            <a:schemeClr val="accent1">
+              <a:shade val="50000"/>
+            </a:schemeClr>
+          </a:lnRef>
+          <a:fillRef idx="1">
+            <a:schemeClr val="accent1"/>
+          </a:fillRef>
+          <a:effectRef idx="0">
+            <a:schemeClr val="accent1"/>
+          </a:effectRef>
+          <a:fontRef idx="minor">
+            <a:schemeClr val="lt1"/>
+          </a:fontRef>
+        </p:style>
+        <p:txBody>
+          <a:bodyPr rtlCol="0" anchor="ctr"/>
+          <a:lstStyle/>
+          <a:p>
+            <a:pPr algn="ctr"/>
+            <a:r>
+              <a:rPr lang="en-US" altLang="ko-KR" sz="2000" b="1" dirty="0" smtClean="0">
+                <a:solidFill>
+                  <a:schemeClr val="tx1"/>
+                </a:solidFill>
+              </a:rPr>
+              <a:t>Dispatcher</a:t>
+            </a:r>
+          </a:p>
+          <a:p>
+            <a:pPr algn="ctr"/>
+            <a:r>
+              <a:rPr lang="en-US" altLang="ko-KR" sz="2000" b="1" dirty="0" smtClean="0">
+                <a:solidFill>
+                  <a:schemeClr val="tx1"/>
+                </a:solidFill>
+              </a:rPr>
+              <a:t>Servlet</a:t>
+            </a:r>
+          </a:p>
+        </p:txBody>
+      </p:sp>
+      <p:sp>
+        <p:nvSpPr>
+          <p:cNvPr id="6" name="직사각형 20"/>
+          <p:cNvSpPr/>
+          <p:nvPr/>
+        </p:nvSpPr>
+        <p:spPr>
+          <a:xfrm>
+            <a:off x="7062130" y="2263410"/>
+            <a:ext cx="1078082" cy="932145"/>
+          </a:xfrm>
+          <a:prstGeom prst="rect">
+            <a:avLst/>
+          </a:prstGeom>
+          <a:noFill/>
+        </p:spPr>
+        <p:style>
+          <a:lnRef idx="2">
+            <a:schemeClr val="accent1">
+              <a:shade val="50000"/>
+            </a:schemeClr>
+          </a:lnRef>
+          <a:fillRef idx="1">
+            <a:schemeClr val="accent1"/>
+          </a:fillRef>
+          <a:effectRef idx="0">
+            <a:schemeClr val="accent1"/>
+          </a:effectRef>
+          <a:fontRef idx="minor">
+            <a:schemeClr val="lt1"/>
+          </a:fontRef>
+        </p:style>
+        <p:txBody>
+          <a:bodyPr rtlCol="0" anchor="ctr"/>
+          <a:lstStyle/>
+          <a:p>
+            <a:pPr algn="ctr"/>
+            <a:r>
+              <a:rPr lang="ko-KR" altLang="en-US" sz="2000" b="1" dirty="0" smtClean="0">
+                <a:solidFill>
+                  <a:schemeClr val="tx1"/>
+                </a:solidFill>
+              </a:rPr>
+              <a:t>서비스</a:t>
+            </a:r>
+            <a:endParaRPr lang="en-US" altLang="ko-KR" sz="2000" b="1" dirty="0" smtClean="0">
+              <a:solidFill>
+                <a:schemeClr val="tx1"/>
+              </a:solidFill>
+            </a:endParaRPr>
+          </a:p>
+        </p:txBody>
+      </p:sp>
+      <p:sp>
+        <p:nvSpPr>
+          <p:cNvPr id="7" name="직사각형 20"/>
+          <p:cNvSpPr/>
+          <p:nvPr/>
+        </p:nvSpPr>
+        <p:spPr>
+          <a:xfrm>
+            <a:off x="8969848" y="1719177"/>
+            <a:ext cx="1794362" cy="1476379"/>
+          </a:xfrm>
+          <a:prstGeom prst="rect">
+            <a:avLst/>
+          </a:prstGeom>
+          <a:noFill/>
+        </p:spPr>
+        <p:style>
+          <a:lnRef idx="2">
+            <a:schemeClr val="accent1">
+              <a:shade val="50000"/>
+            </a:schemeClr>
+          </a:lnRef>
+          <a:fillRef idx="1">
+            <a:schemeClr val="accent1"/>
+          </a:fillRef>
+          <a:effectRef idx="0">
+            <a:schemeClr val="accent1"/>
+          </a:effectRef>
+          <a:fontRef idx="minor">
+            <a:schemeClr val="lt1"/>
+          </a:fontRef>
+        </p:style>
+        <p:txBody>
+          <a:bodyPr rtlCol="0" anchor="ctr"/>
+          <a:lstStyle/>
+          <a:p>
+            <a:pPr algn="ctr"/>
+            <a:r>
+              <a:rPr lang="en-US" altLang="ko-KR" sz="2000" b="1" dirty="0" smtClean="0">
+                <a:solidFill>
+                  <a:schemeClr val="tx1"/>
+                </a:solidFill>
+              </a:rPr>
+              <a:t>Model</a:t>
+            </a:r>
+          </a:p>
+          <a:p>
+            <a:pPr algn="ctr"/>
+            <a:r>
+              <a:rPr lang="en-US" altLang="ko-KR" sz="1400" b="1" dirty="0" smtClean="0">
+                <a:solidFill>
+                  <a:schemeClr val="tx1"/>
+                </a:solidFill>
+              </a:rPr>
+              <a:t>-DAO</a:t>
+            </a:r>
+          </a:p>
+          <a:p>
+            <a:pPr algn="ctr"/>
+            <a:r>
+              <a:rPr lang="en-US" altLang="ko-KR" sz="1400" b="1" dirty="0">
+                <a:solidFill>
+                  <a:schemeClr val="tx1"/>
+                </a:solidFill>
+              </a:rPr>
+              <a:t>@Repository</a:t>
+            </a:r>
+            <a:endParaRPr lang="en-US" altLang="ko-KR" sz="1400" b="1" dirty="0" smtClean="0">
+              <a:solidFill>
+                <a:schemeClr val="tx1"/>
+              </a:solidFill>
+            </a:endParaRPr>
+          </a:p>
+          <a:p>
+            <a:pPr algn="ctr"/>
+            <a:r>
+              <a:rPr lang="en-US" altLang="ko-KR" sz="1400" b="1" dirty="0" smtClean="0">
+                <a:solidFill>
+                  <a:schemeClr val="tx1"/>
+                </a:solidFill>
+              </a:rPr>
+              <a:t>-DTO</a:t>
+            </a:r>
+          </a:p>
+          <a:p>
+            <a:pPr algn="ctr"/>
+            <a:r>
+              <a:rPr lang="en-US" altLang="ko-KR" sz="1400" b="1" dirty="0" smtClean="0">
+                <a:solidFill>
+                  <a:schemeClr val="tx1"/>
+                </a:solidFill>
+              </a:rPr>
+              <a:t>-Business Methods</a:t>
+            </a:r>
+          </a:p>
+        </p:txBody>
+      </p:sp>
+      <p:sp>
+        <p:nvSpPr>
+          <p:cNvPr id="8" name="직사각형 20"/>
+          <p:cNvSpPr/>
+          <p:nvPr/>
+        </p:nvSpPr>
+        <p:spPr>
+          <a:xfrm>
+            <a:off x="9292936" y="4065203"/>
+            <a:ext cx="1148186" cy="932145"/>
+          </a:xfrm>
+          <a:prstGeom prst="rect">
+            <a:avLst/>
+          </a:prstGeom>
+          <a:noFill/>
+        </p:spPr>
+        <p:style>
+          <a:lnRef idx="2">
+            <a:schemeClr val="accent1">
+              <a:shade val="50000"/>
+            </a:schemeClr>
+          </a:lnRef>
+          <a:fillRef idx="1">
+            <a:schemeClr val="accent1"/>
+          </a:fillRef>
+          <a:effectRef idx="0">
+            <a:schemeClr val="accent1"/>
+          </a:effectRef>
+          <a:fontRef idx="minor">
+            <a:schemeClr val="lt1"/>
+          </a:fontRef>
+        </p:style>
+        <p:txBody>
+          <a:bodyPr rtlCol="0" anchor="ctr"/>
+          <a:lstStyle/>
+          <a:p>
+            <a:pPr algn="ctr"/>
+            <a:r>
+              <a:rPr lang="en-US" altLang="ko-KR" sz="2000" b="1" dirty="0" smtClean="0">
+                <a:solidFill>
+                  <a:schemeClr val="tx1"/>
+                </a:solidFill>
+              </a:rPr>
+              <a:t>DB</a:t>
+            </a:r>
+          </a:p>
+        </p:txBody>
+      </p:sp>
+      <p:sp>
+        <p:nvSpPr>
+          <p:cNvPr id="12" name="직사각형 20"/>
+          <p:cNvSpPr/>
+          <p:nvPr/>
+        </p:nvSpPr>
+        <p:spPr>
+          <a:xfrm>
+            <a:off x="768096" y="2249963"/>
+            <a:ext cx="1468470" cy="932145"/>
+          </a:xfrm>
+          <a:prstGeom prst="rect">
+            <a:avLst/>
+          </a:prstGeom>
+          <a:noFill/>
+        </p:spPr>
+        <p:style>
+          <a:lnRef idx="2">
+            <a:schemeClr val="accent1">
+              <a:shade val="50000"/>
+            </a:schemeClr>
+          </a:lnRef>
+          <a:fillRef idx="1">
+            <a:schemeClr val="accent1"/>
+          </a:fillRef>
+          <a:effectRef idx="0">
+            <a:schemeClr val="accent1"/>
+          </a:effectRef>
+          <a:fontRef idx="minor">
+            <a:schemeClr val="lt1"/>
+          </a:fontRef>
+        </p:style>
+        <p:txBody>
+          <a:bodyPr rtlCol="0" anchor="ctr"/>
+          <a:lstStyle/>
+          <a:p>
+            <a:pPr algn="ctr"/>
+            <a:r>
+              <a:rPr lang="ko-KR" altLang="en-US" sz="2000" b="1" dirty="0">
+                <a:solidFill>
+                  <a:schemeClr val="tx1"/>
+                </a:solidFill>
+              </a:rPr>
+              <a:t>클</a:t>
+            </a:r>
+            <a:r>
+              <a:rPr lang="ko-KR" altLang="en-US" sz="2000" b="1" dirty="0" smtClean="0">
+                <a:solidFill>
+                  <a:schemeClr val="tx1"/>
+                </a:solidFill>
+              </a:rPr>
+              <a:t>라이언트</a:t>
+            </a:r>
+            <a:endParaRPr lang="en-US" altLang="ko-KR" sz="2000" b="1" dirty="0" smtClean="0">
+              <a:solidFill>
+                <a:schemeClr val="tx1"/>
+              </a:solidFill>
+            </a:endParaRPr>
+          </a:p>
+          <a:p>
+            <a:pPr algn="ctr"/>
+            <a:r>
+              <a:rPr lang="en-US" altLang="ko-KR" sz="2000" b="1" dirty="0" smtClean="0">
+                <a:solidFill>
+                  <a:schemeClr val="tx1"/>
+                </a:solidFill>
+              </a:rPr>
+              <a:t>VIEW</a:t>
+            </a:r>
+          </a:p>
+        </p:txBody>
+      </p:sp>
+      <p:sp>
+        <p:nvSpPr>
+          <p:cNvPr id="14" name="직사각형 20"/>
+          <p:cNvSpPr/>
+          <p:nvPr/>
+        </p:nvSpPr>
+        <p:spPr>
+          <a:xfrm>
+            <a:off x="4892102" y="2263410"/>
+            <a:ext cx="956788" cy="367647"/>
+          </a:xfrm>
+          <a:prstGeom prst="rect">
+            <a:avLst/>
+          </a:prstGeom>
+          <a:noFill/>
+        </p:spPr>
+        <p:style>
+          <a:lnRef idx="2">
+            <a:schemeClr val="accent1">
+              <a:shade val="50000"/>
+            </a:schemeClr>
+          </a:lnRef>
+          <a:fillRef idx="1">
+            <a:schemeClr val="accent1"/>
+          </a:fillRef>
+          <a:effectRef idx="0">
+            <a:schemeClr val="accent1"/>
+          </a:effectRef>
+          <a:fontRef idx="minor">
+            <a:schemeClr val="lt1"/>
+          </a:fontRef>
+        </p:style>
+        <p:txBody>
+          <a:bodyPr rtlCol="0" anchor="ctr"/>
+          <a:lstStyle/>
+          <a:p>
+            <a:pPr algn="ctr"/>
+            <a:r>
+              <a:rPr lang="ko-KR" altLang="en-US" sz="1200" b="1" dirty="0" smtClean="0">
+                <a:solidFill>
+                  <a:schemeClr val="tx1"/>
+                </a:solidFill>
+              </a:rPr>
+              <a:t>컨트롤러</a:t>
+            </a:r>
+            <a:endParaRPr lang="en-US" altLang="ko-KR" sz="1200" b="1" dirty="0" smtClean="0">
+              <a:solidFill>
+                <a:schemeClr val="tx1"/>
+              </a:solidFill>
+            </a:endParaRPr>
+          </a:p>
+        </p:txBody>
+      </p:sp>
+      <p:sp>
+        <p:nvSpPr>
+          <p:cNvPr id="36" name="Right Arrow 35"/>
+          <p:cNvSpPr/>
+          <p:nvPr/>
+        </p:nvSpPr>
+        <p:spPr>
+          <a:xfrm>
+            <a:off x="2473073" y="2542299"/>
+            <a:ext cx="411480" cy="274320"/>
+          </a:xfrm>
+          <a:prstGeom prst="rightArrow">
+            <a:avLst/>
+          </a:prstGeom>
+        </p:spPr>
+        <p:style>
+          <a:lnRef idx="2">
+            <a:schemeClr val="accent1">
+              <a:shade val="50000"/>
+            </a:schemeClr>
+          </a:lnRef>
+          <a:fillRef idx="1">
+            <a:schemeClr val="accent1"/>
+          </a:fillRef>
+          <a:effectRef idx="0">
+            <a:schemeClr val="accent1"/>
+          </a:effectRef>
+          <a:fontRef idx="minor">
+            <a:schemeClr val="lt1"/>
+          </a:fontRef>
+        </p:style>
+        <p:txBody>
+          <a:bodyPr rtlCol="0" anchor="ctr"/>
+          <a:lstStyle/>
+          <a:p>
+            <a:pPr algn="ctr"/>
+            <a:endParaRPr lang="ko-KR" altLang="en-US"/>
+          </a:p>
+        </p:txBody>
+      </p:sp>
+      <p:sp>
+        <p:nvSpPr>
+          <p:cNvPr id="38" name="Right Arrow 37"/>
+          <p:cNvSpPr/>
+          <p:nvPr/>
+        </p:nvSpPr>
+        <p:spPr>
+          <a:xfrm rot="12505829">
+            <a:off x="2489029" y="3773818"/>
+            <a:ext cx="1241104" cy="381423"/>
+          </a:xfrm>
+          <a:prstGeom prst="rightArrow">
+            <a:avLst/>
+          </a:prstGeom>
+        </p:spPr>
+        <p:style>
+          <a:lnRef idx="2">
+            <a:schemeClr val="accent1">
+              <a:shade val="50000"/>
+            </a:schemeClr>
+          </a:lnRef>
+          <a:fillRef idx="1">
+            <a:schemeClr val="accent1"/>
+          </a:fillRef>
+          <a:effectRef idx="0">
+            <a:schemeClr val="accent1"/>
+          </a:effectRef>
+          <a:fontRef idx="minor">
+            <a:schemeClr val="lt1"/>
+          </a:fontRef>
+        </p:style>
+        <p:txBody>
+          <a:bodyPr rtlCol="0" anchor="ctr"/>
+          <a:lstStyle/>
+          <a:p>
+            <a:pPr algn="ctr"/>
+            <a:endParaRPr lang="ko-KR" altLang="en-US"/>
+          </a:p>
+        </p:txBody>
+      </p:sp>
+      <p:sp>
+        <p:nvSpPr>
+          <p:cNvPr id="40" name="Rectangle 39"/>
+          <p:cNvSpPr/>
+          <p:nvPr/>
+        </p:nvSpPr>
+        <p:spPr>
+          <a:xfrm>
+            <a:off x="3066202" y="2121407"/>
+            <a:ext cx="3166292" cy="1216153"/>
+          </a:xfrm>
+          <a:prstGeom prst="rect">
+            <a:avLst/>
+          </a:prstGeom>
+          <a:noFill/>
+          <a:ln w="50800">
+            <a:solidFill>
+              <a:srgbClr val="0070C0"/>
+            </a:solidFill>
+          </a:ln>
+        </p:spPr>
+        <p:style>
+          <a:lnRef idx="2">
+            <a:schemeClr val="accent1">
+              <a:shade val="50000"/>
+            </a:schemeClr>
+          </a:lnRef>
+          <a:fillRef idx="1">
+            <a:schemeClr val="accent1"/>
+          </a:fillRef>
+          <a:effectRef idx="0">
+            <a:schemeClr val="accent1"/>
+          </a:effectRef>
+          <a:fontRef idx="minor">
+            <a:schemeClr val="lt1"/>
+          </a:fontRef>
+        </p:style>
+        <p:txBody>
+          <a:bodyPr rtlCol="0" anchor="ctr"/>
+          <a:lstStyle/>
+          <a:p>
+            <a:pPr algn="ctr"/>
+            <a:endParaRPr lang="ko-KR" altLang="en-US"/>
+          </a:p>
+        </p:txBody>
+      </p:sp>
+      <p:sp>
+        <p:nvSpPr>
+          <p:cNvPr id="41" name="Right Arrow 40"/>
+          <p:cNvSpPr/>
+          <p:nvPr/>
+        </p:nvSpPr>
+        <p:spPr>
+          <a:xfrm rot="5400000">
+            <a:off x="4574058" y="3596851"/>
+            <a:ext cx="411480" cy="274320"/>
+          </a:xfrm>
+          <a:prstGeom prst="rightArrow">
+            <a:avLst/>
+          </a:prstGeom>
+        </p:spPr>
+        <p:style>
+          <a:lnRef idx="2">
+            <a:schemeClr val="accent1">
+              <a:shade val="50000"/>
+            </a:schemeClr>
+          </a:lnRef>
+          <a:fillRef idx="1">
+            <a:schemeClr val="accent1"/>
+          </a:fillRef>
+          <a:effectRef idx="0">
+            <a:schemeClr val="accent1"/>
+          </a:effectRef>
+          <a:fontRef idx="minor">
+            <a:schemeClr val="lt1"/>
+          </a:fontRef>
+        </p:style>
+        <p:txBody>
+          <a:bodyPr rtlCol="0" anchor="ctr"/>
+          <a:lstStyle/>
+          <a:p>
+            <a:pPr algn="ctr"/>
+            <a:endParaRPr lang="ko-KR" altLang="en-US"/>
+          </a:p>
+        </p:txBody>
+      </p:sp>
+      <p:sp>
+        <p:nvSpPr>
+          <p:cNvPr id="43" name="Right Arrow 42"/>
+          <p:cNvSpPr/>
+          <p:nvPr/>
+        </p:nvSpPr>
+        <p:spPr>
+          <a:xfrm>
+            <a:off x="8349290" y="2455162"/>
+            <a:ext cx="411480" cy="274320"/>
+          </a:xfrm>
+          <a:prstGeom prst="rightArrow">
+            <a:avLst/>
+          </a:prstGeom>
+        </p:spPr>
+        <p:style>
+          <a:lnRef idx="2">
+            <a:schemeClr val="accent1">
+              <a:shade val="50000"/>
+            </a:schemeClr>
+          </a:lnRef>
+          <a:fillRef idx="1">
+            <a:schemeClr val="accent1"/>
+          </a:fillRef>
+          <a:effectRef idx="0">
+            <a:schemeClr val="accent1"/>
+          </a:effectRef>
+          <a:fontRef idx="minor">
+            <a:schemeClr val="lt1"/>
+          </a:fontRef>
+        </p:style>
+        <p:txBody>
+          <a:bodyPr rtlCol="0" anchor="ctr"/>
+          <a:lstStyle/>
+          <a:p>
+            <a:pPr algn="ctr"/>
+            <a:endParaRPr lang="ko-KR" altLang="en-US"/>
+          </a:p>
+        </p:txBody>
+      </p:sp>
+      <p:sp>
+        <p:nvSpPr>
+          <p:cNvPr id="44" name="Right Arrow 43"/>
+          <p:cNvSpPr/>
+          <p:nvPr/>
+        </p:nvSpPr>
+        <p:spPr>
+          <a:xfrm rot="5400000">
+            <a:off x="9524129" y="3542198"/>
+            <a:ext cx="411480" cy="274320"/>
+          </a:xfrm>
+          <a:prstGeom prst="rightArrow">
+            <a:avLst/>
+          </a:prstGeom>
+        </p:spPr>
+        <p:style>
+          <a:lnRef idx="2">
+            <a:schemeClr val="accent1">
+              <a:shade val="50000"/>
+            </a:schemeClr>
+          </a:lnRef>
+          <a:fillRef idx="1">
+            <a:schemeClr val="accent1"/>
+          </a:fillRef>
+          <a:effectRef idx="0">
+            <a:schemeClr val="accent1"/>
+          </a:effectRef>
+          <a:fontRef idx="minor">
+            <a:schemeClr val="lt1"/>
+          </a:fontRef>
+        </p:style>
+        <p:txBody>
+          <a:bodyPr rtlCol="0" anchor="ctr"/>
+          <a:lstStyle/>
+          <a:p>
+            <a:pPr algn="ctr"/>
+            <a:endParaRPr lang="ko-KR" altLang="en-US"/>
+          </a:p>
+        </p:txBody>
+      </p:sp>
+      <p:sp>
+        <p:nvSpPr>
+          <p:cNvPr id="45" name="Right Arrow 44"/>
+          <p:cNvSpPr/>
+          <p:nvPr/>
+        </p:nvSpPr>
+        <p:spPr>
+          <a:xfrm rot="16200000">
+            <a:off x="9798449" y="3542198"/>
+            <a:ext cx="411480" cy="274320"/>
+          </a:xfrm>
+          <a:prstGeom prst="rightArrow">
+            <a:avLst/>
+          </a:prstGeom>
+        </p:spPr>
+        <p:style>
+          <a:lnRef idx="2">
+            <a:schemeClr val="accent1">
+              <a:shade val="50000"/>
+            </a:schemeClr>
+          </a:lnRef>
+          <a:fillRef idx="1">
+            <a:schemeClr val="accent1"/>
+          </a:fillRef>
+          <a:effectRef idx="0">
+            <a:schemeClr val="accent1"/>
+          </a:effectRef>
+          <a:fontRef idx="minor">
+            <a:schemeClr val="lt1"/>
+          </a:fontRef>
+        </p:style>
+        <p:txBody>
+          <a:bodyPr rtlCol="0" anchor="ctr"/>
+          <a:lstStyle/>
+          <a:p>
+            <a:pPr algn="ctr"/>
+            <a:endParaRPr lang="ko-KR" altLang="en-US"/>
+          </a:p>
+        </p:txBody>
+      </p:sp>
+      <p:sp>
+        <p:nvSpPr>
+          <p:cNvPr id="46" name="Right Arrow 45"/>
+          <p:cNvSpPr/>
+          <p:nvPr/>
+        </p:nvSpPr>
+        <p:spPr>
+          <a:xfrm rot="10800000">
+            <a:off x="8349290" y="2729482"/>
+            <a:ext cx="411480" cy="274320"/>
+          </a:xfrm>
+          <a:prstGeom prst="rightArrow">
+            <a:avLst/>
+          </a:prstGeom>
+        </p:spPr>
+        <p:style>
+          <a:lnRef idx="2">
+            <a:schemeClr val="accent1">
+              <a:shade val="50000"/>
+            </a:schemeClr>
+          </a:lnRef>
+          <a:fillRef idx="1">
+            <a:schemeClr val="accent1"/>
+          </a:fillRef>
+          <a:effectRef idx="0">
+            <a:schemeClr val="accent1"/>
+          </a:effectRef>
+          <a:fontRef idx="minor">
+            <a:schemeClr val="lt1"/>
+          </a:fontRef>
+        </p:style>
+        <p:txBody>
+          <a:bodyPr rtlCol="0" anchor="ctr"/>
+          <a:lstStyle/>
+          <a:p>
+            <a:pPr algn="ctr"/>
+            <a:endParaRPr lang="ko-KR" altLang="en-US"/>
+          </a:p>
+        </p:txBody>
+      </p:sp>
+      <p:sp>
+        <p:nvSpPr>
+          <p:cNvPr id="47" name="Right Arrow 46"/>
+          <p:cNvSpPr/>
+          <p:nvPr/>
+        </p:nvSpPr>
+        <p:spPr>
+          <a:xfrm>
+            <a:off x="6408911" y="2455162"/>
+            <a:ext cx="411480" cy="274320"/>
+          </a:xfrm>
+          <a:prstGeom prst="rightArrow">
+            <a:avLst/>
+          </a:prstGeom>
+        </p:spPr>
+        <p:style>
+          <a:lnRef idx="2">
+            <a:schemeClr val="accent1">
+              <a:shade val="50000"/>
+            </a:schemeClr>
+          </a:lnRef>
+          <a:fillRef idx="1">
+            <a:schemeClr val="accent1"/>
+          </a:fillRef>
+          <a:effectRef idx="0">
+            <a:schemeClr val="accent1"/>
+          </a:effectRef>
+          <a:fontRef idx="minor">
+            <a:schemeClr val="lt1"/>
+          </a:fontRef>
+        </p:style>
+        <p:txBody>
+          <a:bodyPr rtlCol="0" anchor="ctr"/>
+          <a:lstStyle/>
+          <a:p>
+            <a:pPr algn="ctr"/>
+            <a:endParaRPr lang="ko-KR" altLang="en-US"/>
+          </a:p>
+        </p:txBody>
+      </p:sp>
+      <p:sp>
+        <p:nvSpPr>
+          <p:cNvPr id="48" name="Right Arrow 47"/>
+          <p:cNvSpPr/>
+          <p:nvPr/>
+        </p:nvSpPr>
+        <p:spPr>
+          <a:xfrm rot="10800000">
+            <a:off x="6408911" y="2729482"/>
+            <a:ext cx="411480" cy="274320"/>
+          </a:xfrm>
+          <a:prstGeom prst="rightArrow">
+            <a:avLst/>
+          </a:prstGeom>
+        </p:spPr>
+        <p:style>
+          <a:lnRef idx="2">
+            <a:schemeClr val="accent1">
+              <a:shade val="50000"/>
+            </a:schemeClr>
+          </a:lnRef>
+          <a:fillRef idx="1">
+            <a:schemeClr val="accent1"/>
+          </a:fillRef>
+          <a:effectRef idx="0">
+            <a:schemeClr val="accent1"/>
+          </a:effectRef>
+          <a:fontRef idx="minor">
+            <a:schemeClr val="lt1"/>
+          </a:fontRef>
+        </p:style>
+        <p:txBody>
+          <a:bodyPr rtlCol="0" anchor="ctr"/>
+          <a:lstStyle/>
+          <a:p>
+            <a:pPr algn="ctr"/>
+            <a:endParaRPr lang="ko-KR" altLang="en-US"/>
+          </a:p>
+        </p:txBody>
+      </p:sp>
+      <p:sp>
+        <p:nvSpPr>
+          <p:cNvPr id="21" name="Rectangle 20"/>
+          <p:cNvSpPr/>
+          <p:nvPr/>
+        </p:nvSpPr>
+        <p:spPr>
+          <a:xfrm>
+            <a:off x="3590434" y="1173345"/>
+            <a:ext cx="2378728" cy="830997"/>
+          </a:xfrm>
+          <a:prstGeom prst="rect">
+            <a:avLst/>
+          </a:prstGeom>
+        </p:spPr>
+        <p:txBody>
+          <a:bodyPr wrap="none">
+            <a:spAutoFit/>
           </a:bodyPr>
           <a:lstStyle/>
           <a:p>
-            <a:r>
-              <a:rPr lang="en-US" altLang="ko-KR" sz="1800" dirty="0"/>
-              <a:t>1. </a:t>
-            </a:r>
-            <a:r>
-              <a:rPr lang="ko-KR" altLang="en-US" sz="1800" dirty="0"/>
-              <a:t>뷰 설정하고 만들고 보여주기</a:t>
-            </a:r>
-          </a:p>
-          <a:p>
-            <a:r>
-              <a:rPr lang="ko-KR" altLang="en-US" sz="1800" dirty="0"/>
-              <a:t>	메인레이아웃</a:t>
-            </a:r>
-          </a:p>
-          <a:p>
-            <a:r>
-              <a:rPr lang="ko-KR" altLang="en-US" sz="1800" dirty="0"/>
-              <a:t>	각 파트</a:t>
-            </a:r>
-          </a:p>
-          <a:p>
-            <a:r>
-              <a:rPr lang="ko-KR" altLang="en-US" sz="1800" dirty="0"/>
-              <a:t>	타일즈 설정</a:t>
-            </a:r>
-          </a:p>
-          <a:p>
-            <a:r>
-              <a:rPr lang="ko-KR" altLang="en-US" sz="1800" dirty="0"/>
-              <a:t>	컨트롤러 이름 설정</a:t>
-            </a:r>
-          </a:p>
-          <a:p>
-            <a:r>
-              <a:rPr lang="ko-KR" altLang="en-US" sz="1800" dirty="0"/>
-              <a:t>		단 타일즈에서 컨트롤러 </a:t>
-            </a:r>
-            <a:r>
-              <a:rPr lang="en-US" altLang="ko-KR" sz="1800" dirty="0"/>
-              <a:t>name</a:t>
-            </a:r>
-            <a:r>
-              <a:rPr lang="ko-KR" altLang="en-US" sz="1800" dirty="0"/>
-              <a:t>이 동일하게</a:t>
-            </a:r>
-          </a:p>
-          <a:p>
-            <a:endParaRPr lang="ko-KR" altLang="en-US" sz="1800" dirty="0"/>
-          </a:p>
-          <a:p>
-            <a:r>
-              <a:rPr lang="en-US" altLang="ko-KR" sz="1800" dirty="0"/>
-              <a:t>2. VO </a:t>
-            </a:r>
-            <a:r>
-              <a:rPr lang="ko-KR" altLang="en-US" sz="1800" dirty="0"/>
-              <a:t>만들기</a:t>
-            </a:r>
-          </a:p>
-          <a:p>
-            <a:r>
-              <a:rPr lang="en-US" altLang="ko-KR" sz="1800" dirty="0"/>
-              <a:t>3. DAO</a:t>
-            </a:r>
-          </a:p>
-          <a:p>
-            <a:r>
-              <a:rPr lang="en-US" altLang="ko-KR" sz="1800" dirty="0"/>
-              <a:t>4. Service</a:t>
-            </a:r>
-          </a:p>
-          <a:p>
-            <a:r>
-              <a:rPr lang="en-US" altLang="ko-KR" sz="1800" dirty="0"/>
-              <a:t>5. </a:t>
-            </a:r>
-            <a:r>
-              <a:rPr lang="ko-KR" altLang="en-US" sz="1800" dirty="0"/>
-              <a:t>컨트롤러 구체적인 설정</a:t>
-            </a:r>
-          </a:p>
-          <a:p>
-            <a:r>
-              <a:rPr lang="ko-KR" altLang="en-US" sz="1800" dirty="0"/>
-              <a:t>	</a:t>
-            </a:r>
-            <a:r>
-              <a:rPr lang="en-US" altLang="ko-KR" sz="1800" dirty="0" err="1"/>
-              <a:t>mybatis</a:t>
-            </a:r>
-            <a:r>
-              <a:rPr lang="en-US" altLang="ko-KR" sz="1800" dirty="0"/>
+            <a:pPr algn="ctr"/>
+            <a:r>
+              <a:rPr lang="ko-KR" altLang="en-US" sz="1200" dirty="0"/>
+              <a:t>클라이언트</a:t>
+            </a:r>
+            <a:r>
+              <a:rPr lang="en-US" altLang="ko-KR" sz="1200" dirty="0"/>
               <a:t> </a:t>
             </a:r>
             <a:r>
-              <a:rPr lang="ko-KR" altLang="en-US" sz="1800" dirty="0"/>
-              <a:t>설정 추가</a:t>
-            </a:r>
-          </a:p>
-          <a:p>
-            <a:r>
-              <a:rPr lang="en-US" altLang="ko-KR" sz="1800" dirty="0"/>
-              <a:t>6. map view</a:t>
-            </a:r>
-            <a:r>
-              <a:rPr lang="ko-KR" altLang="en-US" sz="1800" dirty="0"/>
-              <a:t>가서 </a:t>
-            </a:r>
-            <a:r>
-              <a:rPr lang="en-US" altLang="ko-KR" sz="1800" dirty="0"/>
-              <a:t>body</a:t>
-            </a:r>
-            <a:r>
-              <a:rPr lang="ko-KR" altLang="en-US" sz="1800" dirty="0"/>
-              <a:t>아래</a:t>
-            </a:r>
-          </a:p>
-          <a:p>
-            <a:r>
-              <a:rPr lang="en-US" altLang="ko-KR" sz="1800" dirty="0"/>
-              <a:t>&lt;% </a:t>
-            </a:r>
-            <a:r>
-              <a:rPr lang="en-US" altLang="ko-KR" sz="1800" dirty="0" err="1"/>
-              <a:t>ArrayList</a:t>
-            </a:r>
-            <a:r>
-              <a:rPr lang="en-US" altLang="ko-KR" sz="1800" dirty="0"/>
-              <a:t>&lt;</a:t>
-            </a:r>
-            <a:r>
-              <a:rPr lang="en-US" altLang="ko-KR" sz="1800" dirty="0" err="1"/>
-              <a:t>parkingVO</a:t>
-            </a:r>
-            <a:r>
-              <a:rPr lang="en-US" altLang="ko-KR" sz="1800" dirty="0"/>
-              <a:t>&gt; list = (</a:t>
-            </a:r>
-            <a:r>
-              <a:rPr lang="en-US" altLang="ko-KR" sz="1800" dirty="0" err="1"/>
-              <a:t>ArrayList</a:t>
-            </a:r>
-            <a:r>
-              <a:rPr lang="en-US" altLang="ko-KR" sz="1800" dirty="0"/>
-              <a:t>&lt;</a:t>
-            </a:r>
-            <a:r>
-              <a:rPr lang="en-US" altLang="ko-KR" sz="1800" dirty="0" err="1"/>
-              <a:t>parkingVO</a:t>
-            </a:r>
-            <a:r>
-              <a:rPr lang="en-US" altLang="ko-KR" sz="1800" dirty="0"/>
-              <a:t>&gt;)</a:t>
-            </a:r>
-            <a:r>
-              <a:rPr lang="en-US" altLang="ko-KR" sz="1800" dirty="0" err="1"/>
-              <a:t>request.getAttribute</a:t>
-            </a:r>
-            <a:r>
-              <a:rPr lang="en-US" altLang="ko-KR" sz="1800" dirty="0"/>
-              <a:t>("</a:t>
-            </a:r>
-            <a:r>
-              <a:rPr lang="en-US" altLang="ko-KR" sz="1800" dirty="0" err="1"/>
-              <a:t>parkingInfo</a:t>
-            </a:r>
-            <a:r>
-              <a:rPr lang="en-US" altLang="ko-KR" sz="1800" dirty="0"/>
-              <a:t>") %&gt;</a:t>
-            </a:r>
-          </a:p>
-          <a:p>
-            <a:pPr marL="0" indent="0">
-              <a:buNone/>
-            </a:pPr>
-            <a:r>
-              <a:rPr lang="en-US" altLang="ko-KR" sz="1800" dirty="0"/>
-              <a:t>	</a:t>
-            </a:r>
-          </a:p>
-          <a:p>
-            <a:endParaRPr lang="ko-KR" altLang="en-US" sz="1800" dirty="0"/>
+              <a:rPr lang="ko-KR" altLang="en-US" sz="1200" dirty="0"/>
+              <a:t>요청정보 추출</a:t>
+            </a:r>
+            <a:endParaRPr lang="en-US" altLang="ko-KR" sz="1200" dirty="0"/>
+          </a:p>
+          <a:p>
+            <a:pPr algn="ctr"/>
+            <a:r>
+              <a:rPr lang="en-US" altLang="ko-KR" sz="1200" dirty="0" smtClean="0"/>
+              <a:t>@</a:t>
+            </a:r>
+            <a:r>
+              <a:rPr lang="en-US" altLang="ko-KR" sz="1200" dirty="0" err="1"/>
+              <a:t>RequestMapping</a:t>
+            </a:r>
+            <a:r>
+              <a:rPr lang="en-US" altLang="ko-KR" sz="1200" dirty="0"/>
+              <a:t>("/index.do</a:t>
+            </a:r>
+            <a:r>
+              <a:rPr lang="en-US" altLang="ko-KR" sz="1200" dirty="0" smtClean="0"/>
+              <a:t>")</a:t>
+            </a:r>
+          </a:p>
+          <a:p>
+            <a:pPr algn="ctr"/>
+            <a:r>
+              <a:rPr lang="ko-KR" altLang="en-US" sz="1200" dirty="0" smtClean="0"/>
+              <a:t>서비스 호출</a:t>
+            </a:r>
+            <a:endParaRPr lang="en-US" altLang="ko-KR" sz="1200" dirty="0" smtClean="0"/>
+          </a:p>
+          <a:p>
+            <a:pPr algn="ctr"/>
+            <a:r>
+              <a:rPr lang="ko-KR" altLang="en-US" sz="1200" dirty="0" smtClean="0"/>
+              <a:t>뷰이름 등록</a:t>
+            </a:r>
+            <a:endParaRPr lang="en-US" altLang="ko-KR" sz="1200" dirty="0"/>
+          </a:p>
+        </p:txBody>
+      </p:sp>
+      <p:sp>
+        <p:nvSpPr>
+          <p:cNvPr id="22" name="Rectangle 21"/>
+          <p:cNvSpPr/>
+          <p:nvPr/>
+        </p:nvSpPr>
+        <p:spPr>
+          <a:xfrm>
+            <a:off x="6728977" y="1719177"/>
+            <a:ext cx="1744388" cy="461665"/>
+          </a:xfrm>
+          <a:prstGeom prst="rect">
+            <a:avLst/>
+          </a:prstGeom>
+        </p:spPr>
+        <p:txBody>
+          <a:bodyPr wrap="none">
+            <a:spAutoFit/>
+          </a:bodyPr>
+          <a:lstStyle/>
+          <a:p>
+            <a:pPr algn="ctr"/>
+            <a:r>
+              <a:rPr lang="ko-KR" altLang="en-US" sz="1200" dirty="0" smtClean="0"/>
+              <a:t>요청에 필요한 </a:t>
+            </a:r>
+            <a:endParaRPr lang="en-US" altLang="ko-KR" sz="1200" dirty="0" smtClean="0"/>
+          </a:p>
+          <a:p>
+            <a:pPr algn="ctr"/>
+            <a:r>
+              <a:rPr lang="en-US" altLang="ko-KR" sz="1200" dirty="0" smtClean="0"/>
+              <a:t>Business Method </a:t>
+            </a:r>
+            <a:r>
+              <a:rPr lang="ko-KR" altLang="en-US" sz="1200" dirty="0" smtClean="0"/>
+              <a:t>조합</a:t>
+            </a:r>
+            <a:endParaRPr lang="en-US" altLang="ko-KR" sz="1200" dirty="0"/>
+          </a:p>
+        </p:txBody>
+      </p:sp>
+      <p:sp>
+        <p:nvSpPr>
+          <p:cNvPr id="23" name="Rectangle 22"/>
+          <p:cNvSpPr/>
+          <p:nvPr/>
+        </p:nvSpPr>
+        <p:spPr>
+          <a:xfrm>
+            <a:off x="9466919" y="1173345"/>
+            <a:ext cx="800219" cy="461665"/>
+          </a:xfrm>
+          <a:prstGeom prst="rect">
+            <a:avLst/>
+          </a:prstGeom>
+        </p:spPr>
+        <p:txBody>
+          <a:bodyPr wrap="none">
+            <a:spAutoFit/>
+          </a:bodyPr>
+          <a:lstStyle/>
+          <a:p>
+            <a:pPr algn="ctr"/>
+            <a:r>
+              <a:rPr lang="ko-KR" altLang="en-US" sz="1200" dirty="0" smtClean="0"/>
+              <a:t>두뇌역할</a:t>
+            </a:r>
+            <a:endParaRPr lang="en-US" altLang="ko-KR" sz="1200" dirty="0" smtClean="0"/>
+          </a:p>
+          <a:p>
+            <a:pPr algn="ctr"/>
+            <a:r>
+              <a:rPr lang="en-US" altLang="ko-KR" sz="1200" dirty="0" smtClean="0"/>
+              <a:t>DB</a:t>
+            </a:r>
+            <a:r>
+              <a:rPr lang="ko-KR" altLang="en-US" sz="1200" dirty="0" smtClean="0"/>
+              <a:t>연동</a:t>
+            </a:r>
+            <a:endParaRPr lang="en-US" altLang="ko-KR" sz="1200" dirty="0"/>
+          </a:p>
+        </p:txBody>
+      </p:sp>
+      <p:sp>
+        <p:nvSpPr>
+          <p:cNvPr id="3" name="Rectangle 2"/>
+          <p:cNvSpPr/>
+          <p:nvPr/>
+        </p:nvSpPr>
+        <p:spPr>
+          <a:xfrm>
+            <a:off x="721766" y="1719177"/>
+            <a:ext cx="1470211" cy="369332"/>
+          </a:xfrm>
+          <a:prstGeom prst="rect">
+            <a:avLst/>
+          </a:prstGeom>
+        </p:spPr>
+        <p:txBody>
+          <a:bodyPr wrap="none">
+            <a:spAutoFit/>
+          </a:bodyPr>
+          <a:lstStyle/>
+          <a:p>
+            <a:pPr algn="ctr"/>
+            <a:r>
+              <a:rPr lang="en-US" altLang="ko-KR" dirty="0"/>
+              <a:t>("/</a:t>
+            </a:r>
+            <a:r>
+              <a:rPr lang="en-US" altLang="ko-KR"/>
+              <a:t>index.do</a:t>
+            </a:r>
+            <a:r>
+              <a:rPr lang="en-US" altLang="ko-KR" smtClean="0"/>
+              <a:t>")</a:t>
+            </a:r>
+            <a:endParaRPr lang="en-US" altLang="ko-KR" dirty="0" smtClean="0"/>
+          </a:p>
+        </p:txBody>
+      </p:sp>
+      <p:sp>
+        <p:nvSpPr>
+          <p:cNvPr id="25" name="Rectangle 24"/>
+          <p:cNvSpPr/>
+          <p:nvPr/>
+        </p:nvSpPr>
+        <p:spPr>
+          <a:xfrm>
+            <a:off x="10701605" y="2180842"/>
+            <a:ext cx="1018227" cy="430887"/>
+          </a:xfrm>
+          <a:prstGeom prst="rect">
+            <a:avLst/>
+          </a:prstGeom>
+        </p:spPr>
+        <p:txBody>
+          <a:bodyPr wrap="none">
+            <a:spAutoFit/>
+          </a:bodyPr>
+          <a:lstStyle/>
+          <a:p>
+            <a:pPr algn="ctr"/>
+            <a:r>
+              <a:rPr lang="en-US" altLang="ko-KR" sz="1100" b="1" dirty="0" smtClean="0">
+                <a:solidFill>
+                  <a:srgbClr val="FF0000"/>
+                </a:solidFill>
+              </a:rPr>
+              <a:t>sqlSession</a:t>
+            </a:r>
+          </a:p>
+          <a:p>
+            <a:pPr algn="ctr"/>
+            <a:r>
+              <a:rPr lang="en-US" altLang="ko-KR" sz="1100" b="1" dirty="0" smtClean="0">
+                <a:solidFill>
+                  <a:srgbClr val="FF0000"/>
+                </a:solidFill>
+              </a:rPr>
+              <a:t>Mapper SQL</a:t>
+            </a:r>
+            <a:endParaRPr lang="en-US" altLang="ko-KR" sz="1100" dirty="0">
+              <a:solidFill>
+                <a:srgbClr val="FF0000"/>
+              </a:solidFill>
+            </a:endParaRPr>
+          </a:p>
+        </p:txBody>
+      </p:sp>
+      <p:sp>
+        <p:nvSpPr>
+          <p:cNvPr id="2" name="Rectangle 1"/>
+          <p:cNvSpPr/>
+          <p:nvPr/>
+        </p:nvSpPr>
+        <p:spPr>
+          <a:xfrm>
+            <a:off x="3284039" y="3325790"/>
+            <a:ext cx="1084279" cy="276999"/>
+          </a:xfrm>
+          <a:prstGeom prst="rect">
+            <a:avLst/>
+          </a:prstGeom>
+        </p:spPr>
+        <p:txBody>
+          <a:bodyPr wrap="square">
+            <a:spAutoFit/>
+          </a:bodyPr>
+          <a:lstStyle/>
+          <a:p>
+            <a:pPr algn="ctr"/>
+            <a:r>
+              <a:rPr lang="en-US" altLang="ko-KR" sz="1200" dirty="0" smtClean="0"/>
+              <a:t>VO</a:t>
+            </a:r>
+            <a:endParaRPr lang="en-US" altLang="ko-KR" sz="1200" dirty="0"/>
+          </a:p>
+        </p:txBody>
+      </p:sp>
+      <p:sp>
+        <p:nvSpPr>
+          <p:cNvPr id="26" name="직사각형 20"/>
+          <p:cNvSpPr/>
+          <p:nvPr/>
+        </p:nvSpPr>
+        <p:spPr>
+          <a:xfrm>
+            <a:off x="4902496" y="2748122"/>
+            <a:ext cx="956788" cy="367647"/>
+          </a:xfrm>
+          <a:prstGeom prst="rect">
+            <a:avLst/>
+          </a:prstGeom>
+          <a:noFill/>
+        </p:spPr>
+        <p:style>
+          <a:lnRef idx="2">
+            <a:schemeClr val="accent1">
+              <a:shade val="50000"/>
+            </a:schemeClr>
+          </a:lnRef>
+          <a:fillRef idx="1">
+            <a:schemeClr val="accent1"/>
+          </a:fillRef>
+          <a:effectRef idx="0">
+            <a:schemeClr val="accent1"/>
+          </a:effectRef>
+          <a:fontRef idx="minor">
+            <a:schemeClr val="lt1"/>
+          </a:fontRef>
+        </p:style>
+        <p:txBody>
+          <a:bodyPr rtlCol="0" anchor="ctr"/>
+          <a:lstStyle/>
+          <a:p>
+            <a:pPr algn="ctr"/>
+            <a:r>
+              <a:rPr lang="ko-KR" altLang="en-US" sz="1200" b="1" dirty="0" smtClean="0">
+                <a:solidFill>
+                  <a:schemeClr val="tx1"/>
+                </a:solidFill>
+              </a:rPr>
+              <a:t>컨트롤러</a:t>
+            </a:r>
+            <a:endParaRPr lang="en-US" altLang="ko-KR" sz="1200" b="1" dirty="0" smtClean="0">
+              <a:solidFill>
+                <a:schemeClr val="tx1"/>
+              </a:solidFill>
+            </a:endParaRPr>
+          </a:p>
+        </p:txBody>
+      </p:sp>
+      <p:sp>
+        <p:nvSpPr>
+          <p:cNvPr id="27" name="직사각형 20"/>
+          <p:cNvSpPr/>
+          <p:nvPr/>
+        </p:nvSpPr>
+        <p:spPr>
+          <a:xfrm>
+            <a:off x="3247203" y="1671851"/>
+            <a:ext cx="956788" cy="367647"/>
+          </a:xfrm>
+          <a:prstGeom prst="rect">
+            <a:avLst/>
+          </a:prstGeom>
+          <a:noFill/>
+        </p:spPr>
+        <p:style>
+          <a:lnRef idx="2">
+            <a:schemeClr val="accent1">
+              <a:shade val="50000"/>
+            </a:schemeClr>
+          </a:lnRef>
+          <a:fillRef idx="1">
+            <a:schemeClr val="accent1"/>
+          </a:fillRef>
+          <a:effectRef idx="0">
+            <a:schemeClr val="accent1"/>
+          </a:effectRef>
+          <a:fontRef idx="minor">
+            <a:schemeClr val="lt1"/>
+          </a:fontRef>
+        </p:style>
+        <p:txBody>
+          <a:bodyPr rtlCol="0" anchor="ctr"/>
+          <a:lstStyle/>
+          <a:p>
+            <a:pPr algn="ctr"/>
+            <a:r>
+              <a:rPr lang="en-US" altLang="ko-KR" sz="1200" b="1" smtClean="0">
+                <a:solidFill>
+                  <a:schemeClr val="tx1"/>
+                </a:solidFill>
+              </a:rPr>
+              <a:t>Handler</a:t>
+            </a:r>
+          </a:p>
+          <a:p>
+            <a:pPr algn="ctr"/>
+            <a:r>
+              <a:rPr lang="en-US" altLang="ko-KR" sz="1200" b="1" smtClean="0">
+                <a:solidFill>
+                  <a:schemeClr val="tx1"/>
+                </a:solidFill>
+              </a:rPr>
+              <a:t>Mapping</a:t>
+            </a:r>
+            <a:endParaRPr lang="en-US" altLang="ko-KR" sz="1200" b="1" dirty="0" smtClean="0">
+              <a:solidFill>
+                <a:schemeClr val="tx1"/>
+              </a:solidFill>
+            </a:endParaRPr>
+          </a:p>
+        </p:txBody>
+      </p:sp>
+      <p:sp>
+        <p:nvSpPr>
+          <p:cNvPr id="28" name="Rectangle 27"/>
+          <p:cNvSpPr/>
+          <p:nvPr/>
+        </p:nvSpPr>
+        <p:spPr>
+          <a:xfrm>
+            <a:off x="4577740" y="5198321"/>
+            <a:ext cx="2318263" cy="276999"/>
+          </a:xfrm>
+          <a:prstGeom prst="rect">
+            <a:avLst/>
+          </a:prstGeom>
+        </p:spPr>
+        <p:txBody>
+          <a:bodyPr wrap="none">
+            <a:spAutoFit/>
+          </a:bodyPr>
+          <a:lstStyle/>
+          <a:p>
+            <a:pPr algn="ctr"/>
+            <a:r>
+              <a:rPr lang="en-US" altLang="ko-KR" sz="1200" dirty="0" err="1" smtClean="0"/>
+              <a:t>setViewName</a:t>
+            </a:r>
+            <a:r>
+              <a:rPr lang="ko-KR" altLang="en-US" sz="1200" smtClean="0"/>
+              <a:t>을 타일즈에 설정</a:t>
+            </a:r>
+            <a:endParaRPr lang="en-US" altLang="ko-KR" sz="1200" dirty="0"/>
           </a:p>
         </p:txBody>
       </p:sp>
     </p:spTree>
     <p:extLst>
       <p:ext uri="{BB962C8B-B14F-4D97-AF65-F5344CB8AC3E}">
-        <p14:creationId xmlns:p14="http://schemas.microsoft.com/office/powerpoint/2010/main" val="440446830"/>
+        <p14:creationId xmlns:p14="http://schemas.microsoft.com/office/powerpoint/2010/main" val="3798999474"/>
       </p:ext>
     </p:extLst>
   </p:cSld>
   <p:clrMapOvr>
     <a:masterClrMapping/>
   </p:clrMapOvr>
+  <p:timing>
+    <p:tnLst>
+      <p:par>
+        <p:cTn id="1" dur="indefinite" restart="never" nodeType="tmRoot"/>
+      </p:par>
+    </p:tnLst>
+  </p:timing>
 </p:sld>
 </file>
 
@@ -9535,1264 +10611,222 @@
       </p:grpSpPr>
       <p:sp>
         <p:nvSpPr>
-          <p:cNvPr id="4" name="직사각형 20"/>
-          <p:cNvSpPr/>
-          <p:nvPr/>
-        </p:nvSpPr>
-        <p:spPr>
-          <a:xfrm>
-            <a:off x="4228565" y="4142232"/>
-            <a:ext cx="1102466" cy="932145"/>
-          </a:xfrm>
-          <a:prstGeom prst="rect">
-            <a:avLst/>
-          </a:prstGeom>
-          <a:noFill/>
-        </p:spPr>
-        <p:style>
-          <a:lnRef idx="2">
-            <a:schemeClr val="accent1">
-              <a:shade val="50000"/>
-            </a:schemeClr>
-          </a:lnRef>
-          <a:fillRef idx="1">
-            <a:schemeClr val="accent1"/>
-          </a:fillRef>
-          <a:effectRef idx="0">
-            <a:schemeClr val="accent1"/>
-          </a:effectRef>
-          <a:fontRef idx="minor">
-            <a:schemeClr val="lt1"/>
-          </a:fontRef>
-        </p:style>
-        <p:txBody>
-          <a:bodyPr rtlCol="0" anchor="ctr"/>
-          <a:lstStyle/>
-          <a:p>
-            <a:pPr algn="ctr"/>
-            <a:r>
-              <a:rPr lang="ko-KR" altLang="en-US" sz="2000" b="1" dirty="0" smtClean="0">
-                <a:solidFill>
-                  <a:schemeClr val="tx1"/>
-                </a:solidFill>
-              </a:rPr>
-              <a:t>새로운</a:t>
-            </a:r>
-            <a:endParaRPr lang="en-US" altLang="ko-KR" sz="2000" b="1" dirty="0" smtClean="0">
-              <a:solidFill>
-                <a:schemeClr val="tx1"/>
-              </a:solidFill>
-            </a:endParaRPr>
-          </a:p>
-          <a:p>
-            <a:pPr algn="ctr"/>
-            <a:r>
-              <a:rPr lang="en-US" altLang="ko-KR" sz="2000" b="1" dirty="0" smtClean="0">
-                <a:solidFill>
-                  <a:schemeClr val="tx1"/>
-                </a:solidFill>
-              </a:rPr>
-              <a:t>VIEW</a:t>
-            </a:r>
-          </a:p>
-        </p:txBody>
-      </p:sp>
-      <p:sp>
-        <p:nvSpPr>
-          <p:cNvPr id="5" name="직사각형 20"/>
-          <p:cNvSpPr/>
-          <p:nvPr/>
-        </p:nvSpPr>
-        <p:spPr>
-          <a:xfrm>
-            <a:off x="3132678" y="2249963"/>
-            <a:ext cx="1483802" cy="932145"/>
-          </a:xfrm>
-          <a:prstGeom prst="rect">
-            <a:avLst/>
-          </a:prstGeom>
-          <a:noFill/>
-        </p:spPr>
-        <p:style>
-          <a:lnRef idx="2">
-            <a:schemeClr val="accent1">
-              <a:shade val="50000"/>
-            </a:schemeClr>
-          </a:lnRef>
-          <a:fillRef idx="1">
-            <a:schemeClr val="accent1"/>
-          </a:fillRef>
-          <a:effectRef idx="0">
-            <a:schemeClr val="accent1"/>
-          </a:effectRef>
-          <a:fontRef idx="minor">
-            <a:schemeClr val="lt1"/>
-          </a:fontRef>
-        </p:style>
-        <p:txBody>
-          <a:bodyPr rtlCol="0" anchor="ctr"/>
-          <a:lstStyle/>
-          <a:p>
-            <a:pPr algn="ctr"/>
-            <a:r>
-              <a:rPr lang="en-US" altLang="ko-KR" sz="2000" b="1" dirty="0" smtClean="0">
-                <a:solidFill>
-                  <a:schemeClr val="tx1"/>
-                </a:solidFill>
-              </a:rPr>
-              <a:t>Dispatcher</a:t>
-            </a:r>
-          </a:p>
-          <a:p>
-            <a:pPr algn="ctr"/>
-            <a:r>
-              <a:rPr lang="en-US" altLang="ko-KR" sz="2000" b="1" dirty="0" smtClean="0">
-                <a:solidFill>
-                  <a:schemeClr val="tx1"/>
-                </a:solidFill>
-              </a:rPr>
-              <a:t>Servlet</a:t>
-            </a:r>
-          </a:p>
-        </p:txBody>
-      </p:sp>
-      <p:sp>
-        <p:nvSpPr>
-          <p:cNvPr id="6" name="직사각형 20"/>
-          <p:cNvSpPr/>
-          <p:nvPr/>
-        </p:nvSpPr>
-        <p:spPr>
-          <a:xfrm>
-            <a:off x="7062130" y="2263410"/>
-            <a:ext cx="1078082" cy="932145"/>
-          </a:xfrm>
-          <a:prstGeom prst="rect">
-            <a:avLst/>
-          </a:prstGeom>
-          <a:noFill/>
-        </p:spPr>
-        <p:style>
-          <a:lnRef idx="2">
-            <a:schemeClr val="accent1">
-              <a:shade val="50000"/>
-            </a:schemeClr>
-          </a:lnRef>
-          <a:fillRef idx="1">
-            <a:schemeClr val="accent1"/>
-          </a:fillRef>
-          <a:effectRef idx="0">
-            <a:schemeClr val="accent1"/>
-          </a:effectRef>
-          <a:fontRef idx="minor">
-            <a:schemeClr val="lt1"/>
-          </a:fontRef>
-        </p:style>
-        <p:txBody>
-          <a:bodyPr rtlCol="0" anchor="ctr"/>
-          <a:lstStyle/>
-          <a:p>
-            <a:pPr algn="ctr"/>
-            <a:r>
-              <a:rPr lang="ko-KR" altLang="en-US" sz="2000" b="1" dirty="0" smtClean="0">
-                <a:solidFill>
-                  <a:schemeClr val="tx1"/>
-                </a:solidFill>
-              </a:rPr>
-              <a:t>서비스</a:t>
-            </a:r>
-            <a:endParaRPr lang="en-US" altLang="ko-KR" sz="2000" b="1" dirty="0" smtClean="0">
-              <a:solidFill>
-                <a:schemeClr val="tx1"/>
-              </a:solidFill>
-            </a:endParaRPr>
-          </a:p>
-        </p:txBody>
-      </p:sp>
-      <p:sp>
-        <p:nvSpPr>
-          <p:cNvPr id="7" name="직사각형 20"/>
-          <p:cNvSpPr/>
-          <p:nvPr/>
-        </p:nvSpPr>
-        <p:spPr>
-          <a:xfrm>
-            <a:off x="8969848" y="1719177"/>
-            <a:ext cx="1794362" cy="1476379"/>
-          </a:xfrm>
-          <a:prstGeom prst="rect">
-            <a:avLst/>
-          </a:prstGeom>
-          <a:noFill/>
-        </p:spPr>
-        <p:style>
-          <a:lnRef idx="2">
-            <a:schemeClr val="accent1">
-              <a:shade val="50000"/>
-            </a:schemeClr>
-          </a:lnRef>
-          <a:fillRef idx="1">
-            <a:schemeClr val="accent1"/>
-          </a:fillRef>
-          <a:effectRef idx="0">
-            <a:schemeClr val="accent1"/>
-          </a:effectRef>
-          <a:fontRef idx="minor">
-            <a:schemeClr val="lt1"/>
-          </a:fontRef>
-        </p:style>
-        <p:txBody>
-          <a:bodyPr rtlCol="0" anchor="ctr"/>
-          <a:lstStyle/>
-          <a:p>
-            <a:pPr algn="ctr"/>
-            <a:r>
-              <a:rPr lang="en-US" altLang="ko-KR" sz="2000" b="1" dirty="0" smtClean="0">
-                <a:solidFill>
-                  <a:schemeClr val="tx1"/>
-                </a:solidFill>
-              </a:rPr>
-              <a:t>Model</a:t>
-            </a:r>
-          </a:p>
-          <a:p>
-            <a:pPr algn="ctr"/>
-            <a:r>
-              <a:rPr lang="en-US" altLang="ko-KR" sz="1400" b="1" dirty="0" smtClean="0">
-                <a:solidFill>
-                  <a:schemeClr val="tx1"/>
-                </a:solidFill>
-              </a:rPr>
-              <a:t>-DAO</a:t>
-            </a:r>
-          </a:p>
-          <a:p>
-            <a:pPr algn="ctr"/>
-            <a:r>
-              <a:rPr lang="en-US" altLang="ko-KR" sz="1400" b="1" dirty="0">
-                <a:solidFill>
-                  <a:schemeClr val="tx1"/>
-                </a:solidFill>
-              </a:rPr>
-              <a:t>@Repository</a:t>
-            </a:r>
-            <a:endParaRPr lang="en-US" altLang="ko-KR" sz="1400" b="1" dirty="0" smtClean="0">
-              <a:solidFill>
-                <a:schemeClr val="tx1"/>
-              </a:solidFill>
-            </a:endParaRPr>
-          </a:p>
-          <a:p>
-            <a:pPr algn="ctr"/>
-            <a:r>
-              <a:rPr lang="en-US" altLang="ko-KR" sz="1400" b="1" dirty="0" smtClean="0">
-                <a:solidFill>
-                  <a:schemeClr val="tx1"/>
-                </a:solidFill>
-              </a:rPr>
-              <a:t>-DTO</a:t>
-            </a:r>
-          </a:p>
-          <a:p>
-            <a:pPr algn="ctr"/>
-            <a:r>
-              <a:rPr lang="en-US" altLang="ko-KR" sz="1400" b="1" dirty="0" smtClean="0">
-                <a:solidFill>
-                  <a:schemeClr val="tx1"/>
-                </a:solidFill>
-              </a:rPr>
-              <a:t>-Business Methods</a:t>
-            </a:r>
-          </a:p>
-        </p:txBody>
-      </p:sp>
-      <p:sp>
-        <p:nvSpPr>
-          <p:cNvPr id="8" name="직사각형 20"/>
-          <p:cNvSpPr/>
-          <p:nvPr/>
-        </p:nvSpPr>
-        <p:spPr>
-          <a:xfrm>
-            <a:off x="9292936" y="4065203"/>
-            <a:ext cx="1148186" cy="932145"/>
-          </a:xfrm>
-          <a:prstGeom prst="rect">
-            <a:avLst/>
-          </a:prstGeom>
-          <a:noFill/>
-        </p:spPr>
-        <p:style>
-          <a:lnRef idx="2">
-            <a:schemeClr val="accent1">
-              <a:shade val="50000"/>
-            </a:schemeClr>
-          </a:lnRef>
-          <a:fillRef idx="1">
-            <a:schemeClr val="accent1"/>
-          </a:fillRef>
-          <a:effectRef idx="0">
-            <a:schemeClr val="accent1"/>
-          </a:effectRef>
-          <a:fontRef idx="minor">
-            <a:schemeClr val="lt1"/>
-          </a:fontRef>
-        </p:style>
-        <p:txBody>
-          <a:bodyPr rtlCol="0" anchor="ctr"/>
-          <a:lstStyle/>
-          <a:p>
-            <a:pPr algn="ctr"/>
-            <a:r>
-              <a:rPr lang="en-US" altLang="ko-KR" sz="2000" b="1" dirty="0" smtClean="0">
-                <a:solidFill>
-                  <a:schemeClr val="tx1"/>
-                </a:solidFill>
-              </a:rPr>
-              <a:t>DB</a:t>
-            </a:r>
-          </a:p>
-        </p:txBody>
-      </p:sp>
-      <p:sp>
-        <p:nvSpPr>
-          <p:cNvPr id="12" name="직사각형 20"/>
-          <p:cNvSpPr/>
-          <p:nvPr/>
-        </p:nvSpPr>
-        <p:spPr>
-          <a:xfrm>
-            <a:off x="768096" y="2249963"/>
-            <a:ext cx="1468470" cy="932145"/>
-          </a:xfrm>
-          <a:prstGeom prst="rect">
-            <a:avLst/>
-          </a:prstGeom>
-          <a:noFill/>
-        </p:spPr>
-        <p:style>
-          <a:lnRef idx="2">
-            <a:schemeClr val="accent1">
-              <a:shade val="50000"/>
-            </a:schemeClr>
-          </a:lnRef>
-          <a:fillRef idx="1">
-            <a:schemeClr val="accent1"/>
-          </a:fillRef>
-          <a:effectRef idx="0">
-            <a:schemeClr val="accent1"/>
-          </a:effectRef>
-          <a:fontRef idx="minor">
-            <a:schemeClr val="lt1"/>
-          </a:fontRef>
-        </p:style>
-        <p:txBody>
-          <a:bodyPr rtlCol="0" anchor="ctr"/>
-          <a:lstStyle/>
-          <a:p>
-            <a:pPr algn="ctr"/>
-            <a:r>
-              <a:rPr lang="ko-KR" altLang="en-US" sz="2000" b="1" dirty="0">
-                <a:solidFill>
-                  <a:schemeClr val="tx1"/>
-                </a:solidFill>
-              </a:rPr>
-              <a:t>클</a:t>
-            </a:r>
-            <a:r>
-              <a:rPr lang="ko-KR" altLang="en-US" sz="2000" b="1" dirty="0" smtClean="0">
-                <a:solidFill>
-                  <a:schemeClr val="tx1"/>
-                </a:solidFill>
-              </a:rPr>
-              <a:t>라이언트</a:t>
-            </a:r>
-            <a:endParaRPr lang="en-US" altLang="ko-KR" sz="2000" b="1" dirty="0" smtClean="0">
-              <a:solidFill>
-                <a:schemeClr val="tx1"/>
-              </a:solidFill>
-            </a:endParaRPr>
-          </a:p>
-          <a:p>
-            <a:pPr algn="ctr"/>
-            <a:r>
-              <a:rPr lang="en-US" altLang="ko-KR" sz="2000" b="1" dirty="0" smtClean="0">
-                <a:solidFill>
-                  <a:schemeClr val="tx1"/>
-                </a:solidFill>
-              </a:rPr>
-              <a:t>VIEW</a:t>
-            </a:r>
-          </a:p>
-        </p:txBody>
-      </p:sp>
-      <p:sp>
-        <p:nvSpPr>
-          <p:cNvPr id="14" name="직사각형 20"/>
-          <p:cNvSpPr/>
-          <p:nvPr/>
-        </p:nvSpPr>
-        <p:spPr>
-          <a:xfrm>
-            <a:off x="4892102" y="2263410"/>
-            <a:ext cx="956788" cy="367647"/>
-          </a:xfrm>
-          <a:prstGeom prst="rect">
-            <a:avLst/>
-          </a:prstGeom>
-          <a:noFill/>
-        </p:spPr>
-        <p:style>
-          <a:lnRef idx="2">
-            <a:schemeClr val="accent1">
-              <a:shade val="50000"/>
-            </a:schemeClr>
-          </a:lnRef>
-          <a:fillRef idx="1">
-            <a:schemeClr val="accent1"/>
-          </a:fillRef>
-          <a:effectRef idx="0">
-            <a:schemeClr val="accent1"/>
-          </a:effectRef>
-          <a:fontRef idx="minor">
-            <a:schemeClr val="lt1"/>
-          </a:fontRef>
-        </p:style>
-        <p:txBody>
-          <a:bodyPr rtlCol="0" anchor="ctr"/>
-          <a:lstStyle/>
-          <a:p>
-            <a:pPr algn="ctr"/>
-            <a:r>
-              <a:rPr lang="ko-KR" altLang="en-US" sz="1200" b="1" dirty="0" smtClean="0">
-                <a:solidFill>
-                  <a:schemeClr val="tx1"/>
-                </a:solidFill>
-              </a:rPr>
-              <a:t>컨트롤러</a:t>
-            </a:r>
-            <a:endParaRPr lang="en-US" altLang="ko-KR" sz="1200" b="1" dirty="0" smtClean="0">
-              <a:solidFill>
-                <a:schemeClr val="tx1"/>
-              </a:solidFill>
-            </a:endParaRPr>
-          </a:p>
-        </p:txBody>
-      </p:sp>
-      <p:sp>
-        <p:nvSpPr>
-          <p:cNvPr id="36" name="Right Arrow 35"/>
-          <p:cNvSpPr/>
-          <p:nvPr/>
-        </p:nvSpPr>
-        <p:spPr>
-          <a:xfrm>
-            <a:off x="2473073" y="2542299"/>
-            <a:ext cx="411480" cy="274320"/>
-          </a:xfrm>
-          <a:prstGeom prst="rightArrow">
-            <a:avLst/>
-          </a:prstGeom>
-        </p:spPr>
-        <p:style>
-          <a:lnRef idx="2">
-            <a:schemeClr val="accent1">
-              <a:shade val="50000"/>
-            </a:schemeClr>
-          </a:lnRef>
-          <a:fillRef idx="1">
-            <a:schemeClr val="accent1"/>
-          </a:fillRef>
-          <a:effectRef idx="0">
-            <a:schemeClr val="accent1"/>
-          </a:effectRef>
-          <a:fontRef idx="minor">
-            <a:schemeClr val="lt1"/>
-          </a:fontRef>
-        </p:style>
-        <p:txBody>
-          <a:bodyPr rtlCol="0" anchor="ctr"/>
-          <a:lstStyle/>
-          <a:p>
-            <a:pPr algn="ctr"/>
-            <a:endParaRPr lang="ko-KR" altLang="en-US"/>
-          </a:p>
-        </p:txBody>
-      </p:sp>
-      <p:sp>
-        <p:nvSpPr>
-          <p:cNvPr id="38" name="Right Arrow 37"/>
-          <p:cNvSpPr/>
-          <p:nvPr/>
-        </p:nvSpPr>
-        <p:spPr>
-          <a:xfrm rot="12505829">
-            <a:off x="2489029" y="3773818"/>
-            <a:ext cx="1241104" cy="381423"/>
-          </a:xfrm>
-          <a:prstGeom prst="rightArrow">
-            <a:avLst/>
-          </a:prstGeom>
-        </p:spPr>
-        <p:style>
-          <a:lnRef idx="2">
-            <a:schemeClr val="accent1">
-              <a:shade val="50000"/>
-            </a:schemeClr>
-          </a:lnRef>
-          <a:fillRef idx="1">
-            <a:schemeClr val="accent1"/>
-          </a:fillRef>
-          <a:effectRef idx="0">
-            <a:schemeClr val="accent1"/>
-          </a:effectRef>
-          <a:fontRef idx="minor">
-            <a:schemeClr val="lt1"/>
-          </a:fontRef>
-        </p:style>
-        <p:txBody>
-          <a:bodyPr rtlCol="0" anchor="ctr"/>
-          <a:lstStyle/>
-          <a:p>
-            <a:pPr algn="ctr"/>
-            <a:endParaRPr lang="ko-KR" altLang="en-US"/>
-          </a:p>
-        </p:txBody>
-      </p:sp>
-      <p:sp>
-        <p:nvSpPr>
-          <p:cNvPr id="40" name="Rectangle 39"/>
-          <p:cNvSpPr/>
-          <p:nvPr/>
-        </p:nvSpPr>
-        <p:spPr>
-          <a:xfrm>
-            <a:off x="3066202" y="2121407"/>
-            <a:ext cx="3166292" cy="1216153"/>
-          </a:xfrm>
-          <a:prstGeom prst="rect">
-            <a:avLst/>
-          </a:prstGeom>
-          <a:noFill/>
-          <a:ln w="50800">
-            <a:solidFill>
-              <a:srgbClr val="0070C0"/>
-            </a:solidFill>
-          </a:ln>
-        </p:spPr>
-        <p:style>
-          <a:lnRef idx="2">
-            <a:schemeClr val="accent1">
-              <a:shade val="50000"/>
-            </a:schemeClr>
-          </a:lnRef>
-          <a:fillRef idx="1">
-            <a:schemeClr val="accent1"/>
-          </a:fillRef>
-          <a:effectRef idx="0">
-            <a:schemeClr val="accent1"/>
-          </a:effectRef>
-          <a:fontRef idx="minor">
-            <a:schemeClr val="lt1"/>
-          </a:fontRef>
-        </p:style>
-        <p:txBody>
-          <a:bodyPr rtlCol="0" anchor="ctr"/>
-          <a:lstStyle/>
-          <a:p>
-            <a:pPr algn="ctr"/>
-            <a:endParaRPr lang="ko-KR" altLang="en-US"/>
-          </a:p>
-        </p:txBody>
-      </p:sp>
-      <p:sp>
-        <p:nvSpPr>
-          <p:cNvPr id="41" name="Right Arrow 40"/>
-          <p:cNvSpPr/>
-          <p:nvPr/>
-        </p:nvSpPr>
-        <p:spPr>
-          <a:xfrm rot="5400000">
-            <a:off x="4574058" y="3596851"/>
-            <a:ext cx="411480" cy="274320"/>
-          </a:xfrm>
-          <a:prstGeom prst="rightArrow">
-            <a:avLst/>
-          </a:prstGeom>
-        </p:spPr>
-        <p:style>
-          <a:lnRef idx="2">
-            <a:schemeClr val="accent1">
-              <a:shade val="50000"/>
-            </a:schemeClr>
-          </a:lnRef>
-          <a:fillRef idx="1">
-            <a:schemeClr val="accent1"/>
-          </a:fillRef>
-          <a:effectRef idx="0">
-            <a:schemeClr val="accent1"/>
-          </a:effectRef>
-          <a:fontRef idx="minor">
-            <a:schemeClr val="lt1"/>
-          </a:fontRef>
-        </p:style>
-        <p:txBody>
-          <a:bodyPr rtlCol="0" anchor="ctr"/>
-          <a:lstStyle/>
-          <a:p>
-            <a:pPr algn="ctr"/>
-            <a:endParaRPr lang="ko-KR" altLang="en-US"/>
-          </a:p>
-        </p:txBody>
-      </p:sp>
-      <p:sp>
-        <p:nvSpPr>
-          <p:cNvPr id="43" name="Right Arrow 42"/>
-          <p:cNvSpPr/>
-          <p:nvPr/>
-        </p:nvSpPr>
-        <p:spPr>
-          <a:xfrm>
-            <a:off x="8349290" y="2455162"/>
-            <a:ext cx="411480" cy="274320"/>
-          </a:xfrm>
-          <a:prstGeom prst="rightArrow">
-            <a:avLst/>
-          </a:prstGeom>
-        </p:spPr>
-        <p:style>
-          <a:lnRef idx="2">
-            <a:schemeClr val="accent1">
-              <a:shade val="50000"/>
-            </a:schemeClr>
-          </a:lnRef>
-          <a:fillRef idx="1">
-            <a:schemeClr val="accent1"/>
-          </a:fillRef>
-          <a:effectRef idx="0">
-            <a:schemeClr val="accent1"/>
-          </a:effectRef>
-          <a:fontRef idx="minor">
-            <a:schemeClr val="lt1"/>
-          </a:fontRef>
-        </p:style>
-        <p:txBody>
-          <a:bodyPr rtlCol="0" anchor="ctr"/>
-          <a:lstStyle/>
-          <a:p>
-            <a:pPr algn="ctr"/>
-            <a:endParaRPr lang="ko-KR" altLang="en-US"/>
-          </a:p>
-        </p:txBody>
-      </p:sp>
-      <p:sp>
-        <p:nvSpPr>
-          <p:cNvPr id="44" name="Right Arrow 43"/>
-          <p:cNvSpPr/>
-          <p:nvPr/>
-        </p:nvSpPr>
-        <p:spPr>
-          <a:xfrm rot="5400000">
-            <a:off x="9524129" y="3542198"/>
-            <a:ext cx="411480" cy="274320"/>
-          </a:xfrm>
-          <a:prstGeom prst="rightArrow">
-            <a:avLst/>
-          </a:prstGeom>
-        </p:spPr>
-        <p:style>
-          <a:lnRef idx="2">
-            <a:schemeClr val="accent1">
-              <a:shade val="50000"/>
-            </a:schemeClr>
-          </a:lnRef>
-          <a:fillRef idx="1">
-            <a:schemeClr val="accent1"/>
-          </a:fillRef>
-          <a:effectRef idx="0">
-            <a:schemeClr val="accent1"/>
-          </a:effectRef>
-          <a:fontRef idx="minor">
-            <a:schemeClr val="lt1"/>
-          </a:fontRef>
-        </p:style>
-        <p:txBody>
-          <a:bodyPr rtlCol="0" anchor="ctr"/>
-          <a:lstStyle/>
-          <a:p>
-            <a:pPr algn="ctr"/>
-            <a:endParaRPr lang="ko-KR" altLang="en-US"/>
-          </a:p>
-        </p:txBody>
-      </p:sp>
-      <p:sp>
-        <p:nvSpPr>
-          <p:cNvPr id="45" name="Right Arrow 44"/>
-          <p:cNvSpPr/>
-          <p:nvPr/>
-        </p:nvSpPr>
-        <p:spPr>
-          <a:xfrm rot="16200000">
-            <a:off x="9798449" y="3542198"/>
-            <a:ext cx="411480" cy="274320"/>
-          </a:xfrm>
-          <a:prstGeom prst="rightArrow">
-            <a:avLst/>
-          </a:prstGeom>
-        </p:spPr>
-        <p:style>
-          <a:lnRef idx="2">
-            <a:schemeClr val="accent1">
-              <a:shade val="50000"/>
-            </a:schemeClr>
-          </a:lnRef>
-          <a:fillRef idx="1">
-            <a:schemeClr val="accent1"/>
-          </a:fillRef>
-          <a:effectRef idx="0">
-            <a:schemeClr val="accent1"/>
-          </a:effectRef>
-          <a:fontRef idx="minor">
-            <a:schemeClr val="lt1"/>
-          </a:fontRef>
-        </p:style>
-        <p:txBody>
-          <a:bodyPr rtlCol="0" anchor="ctr"/>
-          <a:lstStyle/>
-          <a:p>
-            <a:pPr algn="ctr"/>
-            <a:endParaRPr lang="ko-KR" altLang="en-US"/>
-          </a:p>
-        </p:txBody>
-      </p:sp>
-      <p:sp>
-        <p:nvSpPr>
-          <p:cNvPr id="46" name="Right Arrow 45"/>
-          <p:cNvSpPr/>
-          <p:nvPr/>
-        </p:nvSpPr>
-        <p:spPr>
-          <a:xfrm rot="10800000">
-            <a:off x="8349290" y="2729482"/>
-            <a:ext cx="411480" cy="274320"/>
-          </a:xfrm>
-          <a:prstGeom prst="rightArrow">
-            <a:avLst/>
-          </a:prstGeom>
-        </p:spPr>
-        <p:style>
-          <a:lnRef idx="2">
-            <a:schemeClr val="accent1">
-              <a:shade val="50000"/>
-            </a:schemeClr>
-          </a:lnRef>
-          <a:fillRef idx="1">
-            <a:schemeClr val="accent1"/>
-          </a:fillRef>
-          <a:effectRef idx="0">
-            <a:schemeClr val="accent1"/>
-          </a:effectRef>
-          <a:fontRef idx="minor">
-            <a:schemeClr val="lt1"/>
-          </a:fontRef>
-        </p:style>
-        <p:txBody>
-          <a:bodyPr rtlCol="0" anchor="ctr"/>
-          <a:lstStyle/>
-          <a:p>
-            <a:pPr algn="ctr"/>
-            <a:endParaRPr lang="ko-KR" altLang="en-US"/>
-          </a:p>
-        </p:txBody>
-      </p:sp>
-      <p:sp>
-        <p:nvSpPr>
-          <p:cNvPr id="47" name="Right Arrow 46"/>
-          <p:cNvSpPr/>
-          <p:nvPr/>
-        </p:nvSpPr>
-        <p:spPr>
-          <a:xfrm>
-            <a:off x="6408911" y="2455162"/>
-            <a:ext cx="411480" cy="274320"/>
-          </a:xfrm>
-          <a:prstGeom prst="rightArrow">
-            <a:avLst/>
-          </a:prstGeom>
-        </p:spPr>
-        <p:style>
-          <a:lnRef idx="2">
-            <a:schemeClr val="accent1">
-              <a:shade val="50000"/>
-            </a:schemeClr>
-          </a:lnRef>
-          <a:fillRef idx="1">
-            <a:schemeClr val="accent1"/>
-          </a:fillRef>
-          <a:effectRef idx="0">
-            <a:schemeClr val="accent1"/>
-          </a:effectRef>
-          <a:fontRef idx="minor">
-            <a:schemeClr val="lt1"/>
-          </a:fontRef>
-        </p:style>
-        <p:txBody>
-          <a:bodyPr rtlCol="0" anchor="ctr"/>
-          <a:lstStyle/>
-          <a:p>
-            <a:pPr algn="ctr"/>
-            <a:endParaRPr lang="ko-KR" altLang="en-US"/>
-          </a:p>
-        </p:txBody>
-      </p:sp>
-      <p:sp>
-        <p:nvSpPr>
-          <p:cNvPr id="48" name="Right Arrow 47"/>
-          <p:cNvSpPr/>
-          <p:nvPr/>
-        </p:nvSpPr>
-        <p:spPr>
-          <a:xfrm rot="10800000">
-            <a:off x="6408911" y="2729482"/>
-            <a:ext cx="411480" cy="274320"/>
-          </a:xfrm>
-          <a:prstGeom prst="rightArrow">
-            <a:avLst/>
-          </a:prstGeom>
-        </p:spPr>
-        <p:style>
-          <a:lnRef idx="2">
-            <a:schemeClr val="accent1">
-              <a:shade val="50000"/>
-            </a:schemeClr>
-          </a:lnRef>
-          <a:fillRef idx="1">
-            <a:schemeClr val="accent1"/>
-          </a:fillRef>
-          <a:effectRef idx="0">
-            <a:schemeClr val="accent1"/>
-          </a:effectRef>
-          <a:fontRef idx="minor">
-            <a:schemeClr val="lt1"/>
-          </a:fontRef>
-        </p:style>
-        <p:txBody>
-          <a:bodyPr rtlCol="0" anchor="ctr"/>
-          <a:lstStyle/>
-          <a:p>
-            <a:pPr algn="ctr"/>
-            <a:endParaRPr lang="ko-KR" altLang="en-US"/>
-          </a:p>
-        </p:txBody>
-      </p:sp>
-      <p:sp>
-        <p:nvSpPr>
-          <p:cNvPr id="21" name="Rectangle 20"/>
-          <p:cNvSpPr/>
-          <p:nvPr/>
-        </p:nvSpPr>
-        <p:spPr>
-          <a:xfrm>
-            <a:off x="3590434" y="1173345"/>
-            <a:ext cx="2378728" cy="830997"/>
-          </a:xfrm>
-          <a:prstGeom prst="rect">
-            <a:avLst/>
-          </a:prstGeom>
-        </p:spPr>
-        <p:txBody>
-          <a:bodyPr wrap="none">
-            <a:spAutoFit/>
+          <p:cNvPr id="3" name="Content Placeholder 2"/>
+          <p:cNvSpPr>
+            <a:spLocks noGrp="1"/>
+          </p:cNvSpPr>
+          <p:nvPr>
+            <p:ph idx="1"/>
+          </p:nvPr>
+        </p:nvSpPr>
+        <p:spPr>
+          <a:xfrm>
+            <a:off x="838200" y="374904"/>
+            <a:ext cx="10515600" cy="5802059"/>
+          </a:xfrm>
+        </p:spPr>
+        <p:txBody>
+          <a:bodyPr>
+            <a:noAutofit/>
           </a:bodyPr>
           <a:lstStyle/>
           <a:p>
-            <a:pPr algn="ctr"/>
-            <a:r>
-              <a:rPr lang="ko-KR" altLang="en-US" sz="1200" dirty="0"/>
-              <a:t>클라이언트</a:t>
-            </a:r>
-            <a:r>
-              <a:rPr lang="en-US" altLang="ko-KR" sz="1200" dirty="0"/>
+            <a:r>
+              <a:rPr lang="en-US" altLang="ko-KR" sz="1800" dirty="0"/>
+              <a:t>1. </a:t>
+            </a:r>
+            <a:r>
+              <a:rPr lang="ko-KR" altLang="en-US" sz="1800" dirty="0"/>
+              <a:t>뷰 설정하고 만들고 보여주기</a:t>
+            </a:r>
+          </a:p>
+          <a:p>
+            <a:r>
+              <a:rPr lang="ko-KR" altLang="en-US" sz="1800" dirty="0"/>
+              <a:t>	메인레이아웃</a:t>
+            </a:r>
+          </a:p>
+          <a:p>
+            <a:r>
+              <a:rPr lang="ko-KR" altLang="en-US" sz="1800" dirty="0"/>
+              <a:t>	각 파트</a:t>
+            </a:r>
+          </a:p>
+          <a:p>
+            <a:r>
+              <a:rPr lang="ko-KR" altLang="en-US" sz="1800" dirty="0"/>
+              <a:t>	타일즈 설정</a:t>
+            </a:r>
+          </a:p>
+          <a:p>
+            <a:r>
+              <a:rPr lang="ko-KR" altLang="en-US" sz="1800" dirty="0"/>
+              <a:t>	컨트롤러 이름 설정</a:t>
+            </a:r>
+          </a:p>
+          <a:p>
+            <a:r>
+              <a:rPr lang="ko-KR" altLang="en-US" sz="1800" dirty="0"/>
+              <a:t>		단 타일즈에서 컨트롤러 </a:t>
+            </a:r>
+            <a:r>
+              <a:rPr lang="en-US" altLang="ko-KR" sz="1800" dirty="0"/>
+              <a:t>name</a:t>
+            </a:r>
+            <a:r>
+              <a:rPr lang="ko-KR" altLang="en-US" sz="1800" dirty="0"/>
+              <a:t>이 동일하게</a:t>
+            </a:r>
+          </a:p>
+          <a:p>
+            <a:endParaRPr lang="ko-KR" altLang="en-US" sz="1800" dirty="0"/>
+          </a:p>
+          <a:p>
+            <a:r>
+              <a:rPr lang="en-US" altLang="ko-KR" sz="1800" dirty="0"/>
+              <a:t>2. VO </a:t>
+            </a:r>
+            <a:r>
+              <a:rPr lang="ko-KR" altLang="en-US" sz="1800" dirty="0"/>
+              <a:t>만들기</a:t>
+            </a:r>
+          </a:p>
+          <a:p>
+            <a:r>
+              <a:rPr lang="en-US" altLang="ko-KR" sz="1800" dirty="0"/>
+              <a:t>3. DAO</a:t>
+            </a:r>
+          </a:p>
+          <a:p>
+            <a:r>
+              <a:rPr lang="en-US" altLang="ko-KR" sz="1800" dirty="0"/>
+              <a:t>4. Service</a:t>
+            </a:r>
+          </a:p>
+          <a:p>
+            <a:r>
+              <a:rPr lang="en-US" altLang="ko-KR" sz="1800" dirty="0"/>
+              <a:t>5. </a:t>
+            </a:r>
+            <a:r>
+              <a:rPr lang="ko-KR" altLang="en-US" sz="1800" dirty="0"/>
+              <a:t>컨트롤러 구체적인 설정</a:t>
+            </a:r>
+          </a:p>
+          <a:p>
+            <a:r>
+              <a:rPr lang="ko-KR" altLang="en-US" sz="1800" dirty="0"/>
+              <a:t>	</a:t>
+            </a:r>
+            <a:r>
+              <a:rPr lang="en-US" altLang="ko-KR" sz="1800" dirty="0" err="1"/>
+              <a:t>mybatis</a:t>
+            </a:r>
+            <a:r>
+              <a:rPr lang="en-US" altLang="ko-KR" sz="1800" dirty="0"/>
               <a:t> </a:t>
             </a:r>
             <a:r>
-              <a:rPr lang="ko-KR" altLang="en-US" sz="1200" dirty="0"/>
-              <a:t>요청정보 추출</a:t>
-            </a:r>
-            <a:endParaRPr lang="en-US" altLang="ko-KR" sz="1200" dirty="0"/>
-          </a:p>
-          <a:p>
-            <a:pPr algn="ctr"/>
-            <a:r>
-              <a:rPr lang="en-US" altLang="ko-KR" sz="1200" dirty="0" smtClean="0"/>
-              <a:t>@</a:t>
-            </a:r>
-            <a:r>
-              <a:rPr lang="en-US" altLang="ko-KR" sz="1200" dirty="0" err="1"/>
-              <a:t>RequestMapping</a:t>
-            </a:r>
-            <a:r>
-              <a:rPr lang="en-US" altLang="ko-KR" sz="1200" dirty="0"/>
-              <a:t>("/index.do</a:t>
-            </a:r>
-            <a:r>
-              <a:rPr lang="en-US" altLang="ko-KR" sz="1200" dirty="0" smtClean="0"/>
-              <a:t>")</a:t>
-            </a:r>
-          </a:p>
-          <a:p>
-            <a:pPr algn="ctr"/>
-            <a:r>
-              <a:rPr lang="ko-KR" altLang="en-US" sz="1200" dirty="0" smtClean="0"/>
-              <a:t>서비스 호출</a:t>
-            </a:r>
-            <a:endParaRPr lang="en-US" altLang="ko-KR" sz="1200" dirty="0" smtClean="0"/>
-          </a:p>
-          <a:p>
-            <a:pPr algn="ctr"/>
-            <a:r>
-              <a:rPr lang="ko-KR" altLang="en-US" sz="1200" dirty="0" smtClean="0"/>
-              <a:t>뷰이름 등록</a:t>
-            </a:r>
-            <a:endParaRPr lang="en-US" altLang="ko-KR" sz="1200" dirty="0"/>
-          </a:p>
-        </p:txBody>
-      </p:sp>
-      <p:sp>
-        <p:nvSpPr>
-          <p:cNvPr id="22" name="Rectangle 21"/>
-          <p:cNvSpPr/>
-          <p:nvPr/>
-        </p:nvSpPr>
-        <p:spPr>
-          <a:xfrm>
-            <a:off x="6728977" y="1719177"/>
-            <a:ext cx="1744388" cy="461665"/>
-          </a:xfrm>
-          <a:prstGeom prst="rect">
-            <a:avLst/>
-          </a:prstGeom>
-        </p:spPr>
-        <p:txBody>
-          <a:bodyPr wrap="none">
-            <a:spAutoFit/>
-          </a:bodyPr>
-          <a:lstStyle/>
-          <a:p>
-            <a:pPr algn="ctr"/>
-            <a:r>
-              <a:rPr lang="ko-KR" altLang="en-US" sz="1200" dirty="0" smtClean="0"/>
-              <a:t>요청에 필요한 </a:t>
-            </a:r>
-            <a:endParaRPr lang="en-US" altLang="ko-KR" sz="1200" dirty="0" smtClean="0"/>
-          </a:p>
-          <a:p>
-            <a:pPr algn="ctr"/>
-            <a:r>
-              <a:rPr lang="en-US" altLang="ko-KR" sz="1200" dirty="0" smtClean="0"/>
-              <a:t>Business Method </a:t>
-            </a:r>
-            <a:r>
-              <a:rPr lang="ko-KR" altLang="en-US" sz="1200" dirty="0" smtClean="0"/>
-              <a:t>조합</a:t>
-            </a:r>
-            <a:endParaRPr lang="en-US" altLang="ko-KR" sz="1200" dirty="0"/>
-          </a:p>
-        </p:txBody>
-      </p:sp>
-      <p:sp>
-        <p:nvSpPr>
-          <p:cNvPr id="23" name="Rectangle 22"/>
-          <p:cNvSpPr/>
-          <p:nvPr/>
-        </p:nvSpPr>
-        <p:spPr>
-          <a:xfrm>
-            <a:off x="9466919" y="1173345"/>
-            <a:ext cx="800219" cy="461665"/>
-          </a:xfrm>
-          <a:prstGeom prst="rect">
-            <a:avLst/>
-          </a:prstGeom>
-        </p:spPr>
-        <p:txBody>
-          <a:bodyPr wrap="none">
-            <a:spAutoFit/>
-          </a:bodyPr>
-          <a:lstStyle/>
-          <a:p>
-            <a:pPr algn="ctr"/>
-            <a:r>
-              <a:rPr lang="ko-KR" altLang="en-US" sz="1200" dirty="0" smtClean="0"/>
-              <a:t>두뇌역할</a:t>
-            </a:r>
-            <a:endParaRPr lang="en-US" altLang="ko-KR" sz="1200" dirty="0" smtClean="0"/>
-          </a:p>
-          <a:p>
-            <a:pPr algn="ctr"/>
-            <a:r>
-              <a:rPr lang="en-US" altLang="ko-KR" sz="1200" dirty="0" smtClean="0"/>
-              <a:t>DB</a:t>
-            </a:r>
-            <a:r>
-              <a:rPr lang="ko-KR" altLang="en-US" sz="1200" dirty="0" smtClean="0"/>
-              <a:t>연동</a:t>
-            </a:r>
-            <a:endParaRPr lang="en-US" altLang="ko-KR" sz="1200" dirty="0"/>
-          </a:p>
-        </p:txBody>
-      </p:sp>
-      <p:sp>
-        <p:nvSpPr>
-          <p:cNvPr id="3" name="Rectangle 2"/>
-          <p:cNvSpPr/>
-          <p:nvPr/>
-        </p:nvSpPr>
-        <p:spPr>
-          <a:xfrm>
-            <a:off x="721766" y="1719177"/>
-            <a:ext cx="1470211" cy="369332"/>
-          </a:xfrm>
-          <a:prstGeom prst="rect">
-            <a:avLst/>
-          </a:prstGeom>
-        </p:spPr>
-        <p:txBody>
-          <a:bodyPr wrap="none">
-            <a:spAutoFit/>
-          </a:bodyPr>
-          <a:lstStyle/>
-          <a:p>
-            <a:pPr algn="ctr"/>
-            <a:r>
-              <a:rPr lang="en-US" altLang="ko-KR" dirty="0"/>
-              <a:t>("/</a:t>
-            </a:r>
-            <a:r>
-              <a:rPr lang="en-US" altLang="ko-KR"/>
-              <a:t>index.do</a:t>
-            </a:r>
-            <a:r>
-              <a:rPr lang="en-US" altLang="ko-KR" smtClean="0"/>
-              <a:t>")</a:t>
-            </a:r>
-            <a:endParaRPr lang="en-US" altLang="ko-KR" dirty="0" smtClean="0"/>
-          </a:p>
-        </p:txBody>
-      </p:sp>
-      <p:sp>
-        <p:nvSpPr>
-          <p:cNvPr id="25" name="Rectangle 24"/>
-          <p:cNvSpPr/>
-          <p:nvPr/>
-        </p:nvSpPr>
-        <p:spPr>
-          <a:xfrm>
-            <a:off x="10701605" y="2180842"/>
-            <a:ext cx="1018227" cy="430887"/>
-          </a:xfrm>
-          <a:prstGeom prst="rect">
-            <a:avLst/>
-          </a:prstGeom>
-        </p:spPr>
-        <p:txBody>
-          <a:bodyPr wrap="none">
-            <a:spAutoFit/>
-          </a:bodyPr>
-          <a:lstStyle/>
-          <a:p>
-            <a:pPr algn="ctr"/>
-            <a:r>
-              <a:rPr lang="en-US" altLang="ko-KR" sz="1100" b="1" dirty="0" smtClean="0">
-                <a:solidFill>
-                  <a:srgbClr val="FF0000"/>
-                </a:solidFill>
-              </a:rPr>
-              <a:t>sqlSession</a:t>
-            </a:r>
-          </a:p>
-          <a:p>
-            <a:pPr algn="ctr"/>
-            <a:r>
-              <a:rPr lang="en-US" altLang="ko-KR" sz="1100" b="1" dirty="0" smtClean="0">
-                <a:solidFill>
-                  <a:srgbClr val="FF0000"/>
-                </a:solidFill>
-              </a:rPr>
-              <a:t>Mapper SQL</a:t>
-            </a:r>
-            <a:endParaRPr lang="en-US" altLang="ko-KR" sz="1100" dirty="0">
-              <a:solidFill>
-                <a:srgbClr val="FF0000"/>
-              </a:solidFill>
-            </a:endParaRPr>
-          </a:p>
-        </p:txBody>
-      </p:sp>
-      <p:sp>
-        <p:nvSpPr>
-          <p:cNvPr id="2" name="Rectangle 1"/>
-          <p:cNvSpPr/>
-          <p:nvPr/>
-        </p:nvSpPr>
-        <p:spPr>
-          <a:xfrm>
-            <a:off x="3284039" y="3325790"/>
-            <a:ext cx="1084279" cy="276999"/>
-          </a:xfrm>
-          <a:prstGeom prst="rect">
-            <a:avLst/>
-          </a:prstGeom>
-        </p:spPr>
-        <p:txBody>
-          <a:bodyPr wrap="square">
-            <a:spAutoFit/>
-          </a:bodyPr>
-          <a:lstStyle/>
-          <a:p>
-            <a:pPr algn="ctr"/>
-            <a:r>
-              <a:rPr lang="en-US" altLang="ko-KR" sz="1200" dirty="0" smtClean="0"/>
-              <a:t>VO</a:t>
-            </a:r>
-            <a:endParaRPr lang="en-US" altLang="ko-KR" sz="1200" dirty="0"/>
-          </a:p>
-        </p:txBody>
-      </p:sp>
-      <p:sp>
-        <p:nvSpPr>
-          <p:cNvPr id="26" name="직사각형 20"/>
-          <p:cNvSpPr/>
-          <p:nvPr/>
-        </p:nvSpPr>
-        <p:spPr>
-          <a:xfrm>
-            <a:off x="4902496" y="2748122"/>
-            <a:ext cx="956788" cy="367647"/>
-          </a:xfrm>
-          <a:prstGeom prst="rect">
-            <a:avLst/>
-          </a:prstGeom>
-          <a:noFill/>
-        </p:spPr>
-        <p:style>
-          <a:lnRef idx="2">
-            <a:schemeClr val="accent1">
-              <a:shade val="50000"/>
-            </a:schemeClr>
-          </a:lnRef>
-          <a:fillRef idx="1">
-            <a:schemeClr val="accent1"/>
-          </a:fillRef>
-          <a:effectRef idx="0">
-            <a:schemeClr val="accent1"/>
-          </a:effectRef>
-          <a:fontRef idx="minor">
-            <a:schemeClr val="lt1"/>
-          </a:fontRef>
-        </p:style>
-        <p:txBody>
-          <a:bodyPr rtlCol="0" anchor="ctr"/>
-          <a:lstStyle/>
-          <a:p>
-            <a:pPr algn="ctr"/>
-            <a:r>
-              <a:rPr lang="ko-KR" altLang="en-US" sz="1200" b="1" dirty="0" smtClean="0">
-                <a:solidFill>
-                  <a:schemeClr val="tx1"/>
-                </a:solidFill>
-              </a:rPr>
-              <a:t>컨트롤러</a:t>
-            </a:r>
-            <a:endParaRPr lang="en-US" altLang="ko-KR" sz="1200" b="1" dirty="0" smtClean="0">
-              <a:solidFill>
-                <a:schemeClr val="tx1"/>
-              </a:solidFill>
-            </a:endParaRPr>
-          </a:p>
-        </p:txBody>
-      </p:sp>
-      <p:sp>
-        <p:nvSpPr>
-          <p:cNvPr id="27" name="직사각형 20"/>
-          <p:cNvSpPr/>
-          <p:nvPr/>
-        </p:nvSpPr>
-        <p:spPr>
-          <a:xfrm>
-            <a:off x="3247203" y="1671851"/>
-            <a:ext cx="956788" cy="367647"/>
-          </a:xfrm>
-          <a:prstGeom prst="rect">
-            <a:avLst/>
-          </a:prstGeom>
-          <a:noFill/>
-        </p:spPr>
-        <p:style>
-          <a:lnRef idx="2">
-            <a:schemeClr val="accent1">
-              <a:shade val="50000"/>
-            </a:schemeClr>
-          </a:lnRef>
-          <a:fillRef idx="1">
-            <a:schemeClr val="accent1"/>
-          </a:fillRef>
-          <a:effectRef idx="0">
-            <a:schemeClr val="accent1"/>
-          </a:effectRef>
-          <a:fontRef idx="minor">
-            <a:schemeClr val="lt1"/>
-          </a:fontRef>
-        </p:style>
-        <p:txBody>
-          <a:bodyPr rtlCol="0" anchor="ctr"/>
-          <a:lstStyle/>
-          <a:p>
-            <a:pPr algn="ctr"/>
-            <a:r>
-              <a:rPr lang="en-US" altLang="ko-KR" sz="1200" b="1" smtClean="0">
-                <a:solidFill>
-                  <a:schemeClr val="tx1"/>
-                </a:solidFill>
-              </a:rPr>
-              <a:t>Handler</a:t>
-            </a:r>
-          </a:p>
-          <a:p>
-            <a:pPr algn="ctr"/>
-            <a:r>
-              <a:rPr lang="en-US" altLang="ko-KR" sz="1200" b="1" smtClean="0">
-                <a:solidFill>
-                  <a:schemeClr val="tx1"/>
-                </a:solidFill>
-              </a:rPr>
-              <a:t>Mapping</a:t>
-            </a:r>
-            <a:endParaRPr lang="en-US" altLang="ko-KR" sz="1200" b="1" dirty="0" smtClean="0">
-              <a:solidFill>
-                <a:schemeClr val="tx1"/>
-              </a:solidFill>
-            </a:endParaRPr>
+              <a:rPr lang="ko-KR" altLang="en-US" sz="1800" dirty="0"/>
+              <a:t>설정 추가</a:t>
+            </a:r>
+          </a:p>
+          <a:p>
+            <a:r>
+              <a:rPr lang="en-US" altLang="ko-KR" sz="1800" dirty="0"/>
+              <a:t>6. map view</a:t>
+            </a:r>
+            <a:r>
+              <a:rPr lang="ko-KR" altLang="en-US" sz="1800" dirty="0"/>
+              <a:t>가서 </a:t>
+            </a:r>
+            <a:r>
+              <a:rPr lang="en-US" altLang="ko-KR" sz="1800" dirty="0"/>
+              <a:t>body</a:t>
+            </a:r>
+            <a:r>
+              <a:rPr lang="ko-KR" altLang="en-US" sz="1800" dirty="0"/>
+              <a:t>아래</a:t>
+            </a:r>
+          </a:p>
+          <a:p>
+            <a:r>
+              <a:rPr lang="en-US" altLang="ko-KR" sz="1800" dirty="0"/>
+              <a:t>&lt;% </a:t>
+            </a:r>
+            <a:r>
+              <a:rPr lang="en-US" altLang="ko-KR" sz="1800" dirty="0" err="1"/>
+              <a:t>ArrayList</a:t>
+            </a:r>
+            <a:r>
+              <a:rPr lang="en-US" altLang="ko-KR" sz="1800" dirty="0"/>
+              <a:t>&lt;</a:t>
+            </a:r>
+            <a:r>
+              <a:rPr lang="en-US" altLang="ko-KR" sz="1800" dirty="0" err="1"/>
+              <a:t>parkingVO</a:t>
+            </a:r>
+            <a:r>
+              <a:rPr lang="en-US" altLang="ko-KR" sz="1800" dirty="0"/>
+              <a:t>&gt; list = (</a:t>
+            </a:r>
+            <a:r>
+              <a:rPr lang="en-US" altLang="ko-KR" sz="1800" dirty="0" err="1"/>
+              <a:t>ArrayList</a:t>
+            </a:r>
+            <a:r>
+              <a:rPr lang="en-US" altLang="ko-KR" sz="1800" dirty="0"/>
+              <a:t>&lt;</a:t>
+            </a:r>
+            <a:r>
+              <a:rPr lang="en-US" altLang="ko-KR" sz="1800" dirty="0" err="1"/>
+              <a:t>parkingVO</a:t>
+            </a:r>
+            <a:r>
+              <a:rPr lang="en-US" altLang="ko-KR" sz="1800" dirty="0"/>
+              <a:t>&gt;)</a:t>
+            </a:r>
+            <a:r>
+              <a:rPr lang="en-US" altLang="ko-KR" sz="1800" dirty="0" err="1"/>
+              <a:t>request.getAttribute</a:t>
+            </a:r>
+            <a:r>
+              <a:rPr lang="en-US" altLang="ko-KR" sz="1800" dirty="0"/>
+              <a:t>("</a:t>
+            </a:r>
+            <a:r>
+              <a:rPr lang="en-US" altLang="ko-KR" sz="1800" dirty="0" err="1"/>
+              <a:t>parkingInfo</a:t>
+            </a:r>
+            <a:r>
+              <a:rPr lang="en-US" altLang="ko-KR" sz="1800" dirty="0"/>
+              <a:t>") %&gt;</a:t>
+            </a:r>
+          </a:p>
+          <a:p>
+            <a:pPr marL="0" indent="0">
+              <a:buNone/>
+            </a:pPr>
+            <a:r>
+              <a:rPr lang="en-US" altLang="ko-KR" sz="1800" dirty="0"/>
+              <a:t>	</a:t>
+            </a:r>
+          </a:p>
+          <a:p>
+            <a:endParaRPr lang="ko-KR" altLang="en-US" sz="1800" dirty="0"/>
           </a:p>
         </p:txBody>
       </p:sp>
     </p:spTree>
     <p:extLst>
       <p:ext uri="{BB962C8B-B14F-4D97-AF65-F5344CB8AC3E}">
-        <p14:creationId xmlns:p14="http://schemas.microsoft.com/office/powerpoint/2010/main" val="3798999474"/>
+        <p14:creationId xmlns:p14="http://schemas.microsoft.com/office/powerpoint/2010/main" val="440446830"/>
       </p:ext>
     </p:extLst>
   </p:cSld>
   <p:clrMapOvr>
     <a:masterClrMapping/>
   </p:clrMapOvr>
-  <p:timing>
-    <p:tnLst>
-      <p:par>
-        <p:cTn id="1" dur="indefinite" restart="never" nodeType="tmRoot"/>
-      </p:par>
-    </p:tnLst>
-  </p:timing>
 </p:sld>
 </file>
 

</xml_diff>